<commit_message>
updated code, analysis, and images
</commit_message>
<xml_diff>
--- a/Horror_Movie_Trends_Project1_11142022_BC.pptx
+++ b/Horror_Movie_Trends_Project1_11142022_BC.pptx
@@ -10,9 +10,10 @@
     <p:sldId id="258" r:id="rId4"/>
     <p:sldId id="259" r:id="rId5"/>
     <p:sldId id="263" r:id="rId6"/>
-    <p:sldId id="260" r:id="rId7"/>
-    <p:sldId id="261" r:id="rId8"/>
-    <p:sldId id="264" r:id="rId9"/>
+    <p:sldId id="264" r:id="rId7"/>
+    <p:sldId id="260" r:id="rId8"/>
+    <p:sldId id="261" r:id="rId9"/>
+    <p:sldId id="265" r:id="rId10"/>
   </p:sldIdLst>
   <p:sldSz cx="12192000" cy="6858000"/>
   <p:notesSz cx="6858000" cy="9144000"/>
@@ -816,7 +817,7 @@
           <a:p>
             <a:fld id="{78ABE3C1-DBE1-495D-B57B-2849774B866A}" type="datetimeFigureOut">
               <a:rPr lang="en-US" smtClean="0"/>
-              <a:t>11/10/22</a:t>
+              <a:t>11/12/22</a:t>
             </a:fld>
             <a:endParaRPr lang="en-US" dirty="0"/>
           </a:p>
@@ -1977,7 +1978,7 @@
           <a:p>
             <a:fld id="{9D6E9DEC-419B-4CC5-A080-3B06BD5A8291}" type="datetimeFigureOut">
               <a:rPr lang="en-US" smtClean="0"/>
-              <a:t>11/10/22</a:t>
+              <a:t>11/12/22</a:t>
             </a:fld>
             <a:endParaRPr lang="en-US" dirty="0"/>
           </a:p>
@@ -3033,7 +3034,7 @@
           <a:p>
             <a:fld id="{9D6E9DEC-419B-4CC5-A080-3B06BD5A8291}" type="datetimeFigureOut">
               <a:rPr lang="en-US" smtClean="0"/>
-              <a:t>11/10/22</a:t>
+              <a:t>11/12/22</a:t>
             </a:fld>
             <a:endParaRPr lang="en-US" dirty="0"/>
           </a:p>
@@ -4248,7 +4249,7 @@
           <a:p>
             <a:fld id="{9D6E9DEC-419B-4CC5-A080-3B06BD5A8291}" type="datetimeFigureOut">
               <a:rPr lang="en-US" smtClean="0"/>
-              <a:t>11/10/22</a:t>
+              <a:t>11/12/22</a:t>
             </a:fld>
             <a:endParaRPr lang="en-US" dirty="0"/>
           </a:p>
@@ -5354,7 +5355,7 @@
           <a:p>
             <a:fld id="{9D6E9DEC-419B-4CC5-A080-3B06BD5A8291}" type="datetimeFigureOut">
               <a:rPr lang="en-US" smtClean="0"/>
-              <a:t>11/10/22</a:t>
+              <a:t>11/12/22</a:t>
             </a:fld>
             <a:endParaRPr lang="en-US" dirty="0"/>
           </a:p>
@@ -6008,7 +6009,7 @@
           <a:p>
             <a:fld id="{9D6E9DEC-419B-4CC5-A080-3B06BD5A8291}" type="datetimeFigureOut">
               <a:rPr lang="en-US" smtClean="0"/>
-              <a:t>11/10/22</a:t>
+              <a:t>11/12/22</a:t>
             </a:fld>
             <a:endParaRPr lang="en-US" dirty="0"/>
           </a:p>
@@ -6857,7 +6858,7 @@
           <a:p>
             <a:fld id="{9D6E9DEC-419B-4CC5-A080-3B06BD5A8291}" type="datetimeFigureOut">
               <a:rPr lang="en-US" smtClean="0"/>
-              <a:t>11/10/22</a:t>
+              <a:t>11/12/22</a:t>
             </a:fld>
             <a:endParaRPr lang="en-US" dirty="0"/>
           </a:p>
@@ -7044,7 +7045,7 @@
           <a:p>
             <a:fld id="{1FA3F48C-C7C6-4055-9F49-3777875E72AE}" type="datetimeFigureOut">
               <a:rPr lang="en-US" smtClean="0"/>
-              <a:t>11/10/22</a:t>
+              <a:t>11/12/22</a:t>
             </a:fld>
             <a:endParaRPr lang="en-US" dirty="0"/>
           </a:p>
@@ -8085,7 +8086,7 @@
           <a:p>
             <a:fld id="{6178E61D-D431-422C-9764-11DAFE33AB63}" type="datetimeFigureOut">
               <a:rPr lang="en-US" smtClean="0"/>
-              <a:t>11/10/22</a:t>
+              <a:t>11/12/22</a:t>
             </a:fld>
             <a:endParaRPr lang="en-US" dirty="0"/>
           </a:p>
@@ -8302,7 +8303,7 @@
           <a:p>
             <a:fld id="{12DE42F4-6EEF-4EF7-8ED4-2208F0F89A08}" type="datetimeFigureOut">
               <a:rPr lang="en-US" smtClean="0"/>
-              <a:t>11/10/22</a:t>
+              <a:t>11/12/22</a:t>
             </a:fld>
             <a:endParaRPr lang="en-US" dirty="0"/>
           </a:p>
@@ -9407,7 +9408,7 @@
           <a:p>
             <a:fld id="{30578ACC-22D6-47C1-A373-4FD133E34F3C}" type="datetimeFigureOut">
               <a:rPr lang="en-US" smtClean="0"/>
-              <a:t>11/10/22</a:t>
+              <a:t>11/12/22</a:t>
             </a:fld>
             <a:endParaRPr lang="en-US" dirty="0"/>
           </a:p>
@@ -9679,7 +9680,7 @@
           <a:p>
             <a:fld id="{4E5A6C69-6797-4E8A-BF37-F2C3751466E9}" type="datetimeFigureOut">
               <a:rPr lang="en-US" smtClean="0"/>
-              <a:t>11/10/22</a:t>
+              <a:t>11/12/22</a:t>
             </a:fld>
             <a:endParaRPr lang="en-US" dirty="0"/>
           </a:p>
@@ -10061,7 +10062,7 @@
           <a:p>
             <a:fld id="{D82014A1-A632-4878-A0D3-F52BA7563730}" type="datetimeFigureOut">
               <a:rPr lang="en-US" smtClean="0"/>
-              <a:t>11/10/22</a:t>
+              <a:t>11/12/22</a:t>
             </a:fld>
             <a:endParaRPr lang="en-US" dirty="0"/>
           </a:p>
@@ -10179,7 +10180,7 @@
           <a:p>
             <a:fld id="{CE99F462-093F-4566-844B-4C71F2739DA5}" type="datetimeFigureOut">
               <a:rPr lang="en-US" smtClean="0"/>
-              <a:t>11/10/22</a:t>
+              <a:t>11/12/22</a:t>
             </a:fld>
             <a:endParaRPr lang="en-US" dirty="0"/>
           </a:p>
@@ -10274,7 +10275,7 @@
           <a:p>
             <a:fld id="{3D24A7AC-904D-4781-85BA-7D10C17ED021}" type="datetimeFigureOut">
               <a:rPr lang="en-US" smtClean="0"/>
-              <a:t>11/10/22</a:t>
+              <a:t>11/12/22</a:t>
             </a:fld>
             <a:endParaRPr lang="en-US" dirty="0"/>
           </a:p>
@@ -11426,7 +11427,7 @@
           <a:p>
             <a:fld id="{E331444B-B92B-4E27-8C94-BB93EAF5CB18}" type="datetimeFigureOut">
               <a:rPr lang="en-US" smtClean="0"/>
-              <a:t>11/10/22</a:t>
+              <a:t>11/12/22</a:t>
             </a:fld>
             <a:endParaRPr lang="en-US" dirty="0"/>
           </a:p>
@@ -12602,7 +12603,7 @@
           <a:p>
             <a:fld id="{363EFA5E-FA76-400D-B3DC-F0BA90E6D107}" type="datetimeFigureOut">
               <a:rPr lang="en-US" smtClean="0"/>
-              <a:t>11/10/22</a:t>
+              <a:t>11/12/22</a:t>
             </a:fld>
             <a:endParaRPr lang="en-US" dirty="0"/>
           </a:p>
@@ -13708,7 +13709,7 @@
           <a:p>
             <a:fld id="{9D6E9DEC-419B-4CC5-A080-3B06BD5A8291}" type="datetimeFigureOut">
               <a:rPr lang="en-US" smtClean="0"/>
-              <a:t>11/10/22</a:t>
+              <a:t>11/12/22</a:t>
             </a:fld>
             <a:endParaRPr lang="en-US" dirty="0"/>
           </a:p>
@@ -16401,7 +16402,7 @@
           <p:cNvPr id="2" name="Title 1">
             <a:extLst>
               <a:ext uri="{FF2B5EF4-FFF2-40B4-BE49-F238E27FC236}">
-                <a16:creationId xmlns:a16="http://schemas.microsoft.com/office/drawing/2014/main" id="{62996E13-90E2-C085-109D-9CB4B9409557}"/>
+                <a16:creationId xmlns:a16="http://schemas.microsoft.com/office/drawing/2014/main" id="{303A4144-7281-3A71-046F-A706B6954FD3}"/>
               </a:ext>
             </a:extLst>
           </p:cNvPr>
@@ -16425,11 +16426,8 @@
           <a:lstStyle/>
           <a:p>
             <a:r>
-              <a:rPr lang="en-US" dirty="0">
-                <a:latin typeface="Simplified Arabic Fixed" panose="02070309020205020404" pitchFamily="49" charset="-78"/>
-                <a:cs typeface="Simplified Arabic Fixed" panose="02070309020205020404" pitchFamily="49" charset="-78"/>
-              </a:rPr>
-              <a:t>Country Analysis: Question 1</a:t>
+              <a:rPr lang="en-US" dirty="0"/>
+              <a:t>Country Analysis Facts 2012-2017</a:t>
             </a:r>
           </a:p>
         </p:txBody>
@@ -16439,7 +16437,7 @@
           <p:cNvPr id="3" name="Content Placeholder 2">
             <a:extLst>
               <a:ext uri="{FF2B5EF4-FFF2-40B4-BE49-F238E27FC236}">
-                <a16:creationId xmlns:a16="http://schemas.microsoft.com/office/drawing/2014/main" id="{57505223-4AEB-2246-ACA4-BBD7BED52E1B}"/>
+                <a16:creationId xmlns:a16="http://schemas.microsoft.com/office/drawing/2014/main" id="{772DE080-3718-DDFA-30F7-7F4D0087CE7B}"/>
               </a:ext>
             </a:extLst>
           </p:cNvPr>
@@ -16453,7 +16451,7 @@
         <p:spPr>
           <a:xfrm>
             <a:off x="1154954" y="2603500"/>
-            <a:ext cx="4941045" cy="3416300"/>
+            <a:ext cx="5211979" cy="3416300"/>
           </a:xfrm>
         </p:spPr>
         <p:txBody>
@@ -16463,73 +16461,1689 @@
           <a:lstStyle/>
           <a:p>
             <a:r>
-              <a:rPr lang="en-US" sz="1600" dirty="0"/>
-              <a:t>What country spends the most on average per movie?</a:t>
+              <a:rPr lang="en-US" dirty="0"/>
+              <a:t>Highlights</a:t>
             </a:r>
           </a:p>
           <a:p>
             <a:pPr lvl="1"/>
             <a:r>
-              <a:rPr lang="en-US" sz="1400" dirty="0"/>
-              <a:t>There were over 70 countries in the data set, but not all the movies had budget data</a:t>
+              <a:rPr lang="en-US" dirty="0"/>
+              <a:t>14 countries out 55 were included in the analysis</a:t>
             </a:r>
           </a:p>
           <a:p>
             <a:pPr lvl="1"/>
             <a:r>
-              <a:rPr lang="en-US" sz="1400" dirty="0"/>
-              <a:t>The data was cleaned to only include countries with 10 or more movies and only include movies with a US currency budget amount</a:t>
+              <a:rPr lang="en-US" dirty="0"/>
+              <a:t>Cleaned data included: rows that had both a budget amount and a review rating</a:t>
             </a:r>
           </a:p>
           <a:p>
             <a:pPr lvl="1"/>
-            <a:endParaRPr lang="en-US" sz="1400" dirty="0"/>
+            <a:r>
+              <a:rPr lang="en-US" dirty="0"/>
+              <a:t>India’s average budget is roughly $72 million more per movie than the United States</a:t>
+            </a:r>
+          </a:p>
+          <a:p>
+            <a:pPr lvl="1"/>
+            <a:r>
+              <a:rPr lang="en-US" dirty="0"/>
+              <a:t>US made 508 more movies during this period than the rest of the countries</a:t>
+            </a:r>
+          </a:p>
+          <a:p>
+            <a:endParaRPr lang="en-US" dirty="0"/>
           </a:p>
         </p:txBody>
       </p:sp>
-      <p:pic>
-        <p:nvPicPr>
-          <p:cNvPr id="4" name="Picture 3">
+      <p:graphicFrame>
+        <p:nvGraphicFramePr>
+          <p:cNvPr id="4" name="Table 3">
             <a:extLst>
               <a:ext uri="{FF2B5EF4-FFF2-40B4-BE49-F238E27FC236}">
-                <a16:creationId xmlns:a16="http://schemas.microsoft.com/office/drawing/2014/main" id="{A248A11E-98C8-7242-8CE6-58A9A6548D2E}"/>
+                <a16:creationId xmlns:a16="http://schemas.microsoft.com/office/drawing/2014/main" id="{4E93A40F-F9BB-3460-62D1-6210ED6675AB}"/>
               </a:ext>
             </a:extLst>
           </p:cNvPr>
-          <p:cNvPicPr>
-            <a:picLocks noChangeAspect="1"/>
-          </p:cNvPicPr>
-          <p:nvPr/>
-        </p:nvPicPr>
-        <p:blipFill>
-          <a:blip r:embed="rId2"/>
-          <a:stretch>
-            <a:fillRect/>
-          </a:stretch>
-        </p:blipFill>
-        <p:spPr>
-          <a:xfrm>
-            <a:off x="6518235" y="2603500"/>
-            <a:ext cx="5214199" cy="3306580"/>
-          </a:xfrm>
-          <a:prstGeom prst="roundRect">
-            <a:avLst>
-              <a:gd name="adj" fmla="val 1858"/>
-            </a:avLst>
-          </a:prstGeom>
-          <a:effectLst>
-            <a:outerShdw blurRad="50800" dist="50800" dir="5400000" algn="tl" rotWithShape="0">
-              <a:srgbClr val="000000">
-                <a:alpha val="43000"/>
-              </a:srgbClr>
-            </a:outerShdw>
-          </a:effectLst>
-        </p:spPr>
-      </p:pic>
+          <p:cNvGraphicFramePr>
+            <a:graphicFrameLocks noGrp="1"/>
+          </p:cNvGraphicFramePr>
+          <p:nvPr>
+            <p:extLst>
+              <p:ext uri="{D42A27DB-BD31-4B8C-83A1-F6EECF244321}">
+                <p14:modId xmlns:p14="http://schemas.microsoft.com/office/powerpoint/2010/main" val="2060260119"/>
+              </p:ext>
+            </p:extLst>
+          </p:nvPr>
+        </p:nvGraphicFramePr>
+        <p:xfrm>
+          <a:off x="7140406" y="2775951"/>
+          <a:ext cx="3661679" cy="3067168"/>
+        </p:xfrm>
+        <a:graphic>
+          <a:graphicData uri="http://schemas.openxmlformats.org/drawingml/2006/table">
+            <a:tbl>
+              <a:tblPr firstRow="1" bandRow="1">
+                <a:tableStyleId>{5C22544A-7EE6-4342-B048-85BDC9FD1C3A}</a:tableStyleId>
+              </a:tblPr>
+              <a:tblGrid>
+                <a:gridCol w="1109409">
+                  <a:extLst>
+                    <a:ext uri="{9D8B030D-6E8A-4147-A177-3AD203B41FA5}">
+                      <a16:colId xmlns:a16="http://schemas.microsoft.com/office/drawing/2014/main" val="1144596838"/>
+                    </a:ext>
+                  </a:extLst>
+                </a:gridCol>
+                <a:gridCol w="492913">
+                  <a:extLst>
+                    <a:ext uri="{9D8B030D-6E8A-4147-A177-3AD203B41FA5}">
+                      <a16:colId xmlns:a16="http://schemas.microsoft.com/office/drawing/2014/main" val="770951781"/>
+                    </a:ext>
+                  </a:extLst>
+                </a:gridCol>
+                <a:gridCol w="1085206">
+                  <a:extLst>
+                    <a:ext uri="{9D8B030D-6E8A-4147-A177-3AD203B41FA5}">
+                      <a16:colId xmlns:a16="http://schemas.microsoft.com/office/drawing/2014/main" val="2287337983"/>
+                    </a:ext>
+                  </a:extLst>
+                </a:gridCol>
+                <a:gridCol w="974151">
+                  <a:extLst>
+                    <a:ext uri="{9D8B030D-6E8A-4147-A177-3AD203B41FA5}">
+                      <a16:colId xmlns:a16="http://schemas.microsoft.com/office/drawing/2014/main" val="4139613007"/>
+                    </a:ext>
+                  </a:extLst>
+                </a:gridCol>
+              </a:tblGrid>
+              <a:tr h="191698">
+                <a:tc>
+                  <a:txBody>
+                    <a:bodyPr/>
+                    <a:lstStyle/>
+                    <a:p>
+                      <a:pPr algn="l" fontAlgn="b"/>
+                      <a:r>
+                        <a:rPr lang="en-US" sz="1000" u="none" strike="noStrike">
+                          <a:effectLst/>
+                        </a:rPr>
+                        <a:t>Release Country</a:t>
+                      </a:r>
+                      <a:endParaRPr lang="en-US" sz="1000" b="1" i="0" u="none" strike="noStrike">
+                        <a:solidFill>
+                          <a:srgbClr val="000000"/>
+                        </a:solidFill>
+                        <a:effectLst/>
+                        <a:latin typeface="Helvetica" pitchFamily="2" charset="0"/>
+                      </a:endParaRPr>
+                    </a:p>
+                  </a:txBody>
+                  <a:tcPr marL="8543" marR="8543" marT="8543" marB="0" anchor="b"/>
+                </a:tc>
+                <a:tc>
+                  <a:txBody>
+                    <a:bodyPr/>
+                    <a:lstStyle/>
+                    <a:p>
+                      <a:pPr algn="l" fontAlgn="b"/>
+                      <a:r>
+                        <a:rPr lang="en-US" sz="1000" u="none" strike="noStrike">
+                          <a:effectLst/>
+                        </a:rPr>
+                        <a:t>Count</a:t>
+                      </a:r>
+                      <a:endParaRPr lang="en-US" sz="1000" b="1" i="0" u="none" strike="noStrike">
+                        <a:solidFill>
+                          <a:srgbClr val="000000"/>
+                        </a:solidFill>
+                        <a:effectLst/>
+                        <a:latin typeface="Helvetica" pitchFamily="2" charset="0"/>
+                      </a:endParaRPr>
+                    </a:p>
+                  </a:txBody>
+                  <a:tcPr marL="8543" marR="8543" marT="8543" marB="0" anchor="b"/>
+                </a:tc>
+                <a:tc>
+                  <a:txBody>
+                    <a:bodyPr/>
+                    <a:lstStyle/>
+                    <a:p>
+                      <a:pPr algn="l" fontAlgn="b"/>
+                      <a:r>
+                        <a:rPr lang="en-US" sz="1000" u="none" strike="noStrike">
+                          <a:effectLst/>
+                        </a:rPr>
+                        <a:t> Budget </a:t>
+                      </a:r>
+                      <a:endParaRPr lang="en-US" sz="1000" b="1" i="0" u="none" strike="noStrike">
+                        <a:solidFill>
+                          <a:srgbClr val="000000"/>
+                        </a:solidFill>
+                        <a:effectLst/>
+                        <a:latin typeface="Helvetica" pitchFamily="2" charset="0"/>
+                      </a:endParaRPr>
+                    </a:p>
+                  </a:txBody>
+                  <a:tcPr marL="8543" marR="8543" marT="8543" marB="0" anchor="b"/>
+                </a:tc>
+                <a:tc>
+                  <a:txBody>
+                    <a:bodyPr/>
+                    <a:lstStyle/>
+                    <a:p>
+                      <a:pPr algn="l" fontAlgn="b"/>
+                      <a:r>
+                        <a:rPr lang="en-US" sz="1000" u="none" strike="noStrike">
+                          <a:effectLst/>
+                        </a:rPr>
+                        <a:t>Review Rating</a:t>
+                      </a:r>
+                      <a:endParaRPr lang="en-US" sz="1000" b="1" i="0" u="none" strike="noStrike">
+                        <a:solidFill>
+                          <a:srgbClr val="000000"/>
+                        </a:solidFill>
+                        <a:effectLst/>
+                        <a:latin typeface="Helvetica" pitchFamily="2" charset="0"/>
+                      </a:endParaRPr>
+                    </a:p>
+                  </a:txBody>
+                  <a:tcPr marL="8543" marR="8543" marT="8543" marB="0" anchor="b"/>
+                </a:tc>
+                <a:extLst>
+                  <a:ext uri="{0D108BD9-81ED-4DB2-BD59-A6C34878D82A}">
+                    <a16:rowId xmlns:a16="http://schemas.microsoft.com/office/drawing/2014/main" val="228348202"/>
+                  </a:ext>
+                </a:extLst>
+              </a:tr>
+              <a:tr h="191698">
+                <a:tc>
+                  <a:txBody>
+                    <a:bodyPr/>
+                    <a:lstStyle/>
+                    <a:p>
+                      <a:pPr algn="l" fontAlgn="b"/>
+                      <a:r>
+                        <a:rPr lang="en-US" sz="1000" u="none" strike="noStrike">
+                          <a:effectLst/>
+                        </a:rPr>
+                        <a:t>India</a:t>
+                      </a:r>
+                      <a:endParaRPr lang="en-US" sz="1000" b="0" i="0" u="none" strike="noStrike">
+                        <a:solidFill>
+                          <a:srgbClr val="000000"/>
+                        </a:solidFill>
+                        <a:effectLst/>
+                        <a:latin typeface="Helvetica" pitchFamily="2" charset="0"/>
+                      </a:endParaRPr>
+                    </a:p>
+                  </a:txBody>
+                  <a:tcPr marL="8543" marR="8543" marT="8543" marB="0" anchor="b"/>
+                </a:tc>
+                <a:tc>
+                  <a:txBody>
+                    <a:bodyPr/>
+                    <a:lstStyle/>
+                    <a:p>
+                      <a:pPr algn="r" fontAlgn="b"/>
+                      <a:r>
+                        <a:rPr lang="en-US" sz="1000" u="none" strike="noStrike">
+                          <a:effectLst/>
+                        </a:rPr>
+                        <a:t>29</a:t>
+                      </a:r>
+                      <a:endParaRPr lang="en-US" sz="1000" b="0" i="0" u="none" strike="noStrike">
+                        <a:solidFill>
+                          <a:srgbClr val="000000"/>
+                        </a:solidFill>
+                        <a:effectLst/>
+                        <a:latin typeface="Helvetica" pitchFamily="2" charset="0"/>
+                      </a:endParaRPr>
+                    </a:p>
+                  </a:txBody>
+                  <a:tcPr marL="8543" marR="8543" marT="8543" marB="0" anchor="b"/>
+                </a:tc>
+                <a:tc>
+                  <a:txBody>
+                    <a:bodyPr/>
+                    <a:lstStyle/>
+                    <a:p>
+                      <a:pPr algn="l" fontAlgn="b"/>
+                      <a:r>
+                        <a:rPr lang="en-US" sz="1000" u="none" strike="noStrike">
+                          <a:effectLst/>
+                        </a:rPr>
+                        <a:t> $ 76,950,800.00 </a:t>
+                      </a:r>
+                      <a:endParaRPr lang="en-US" sz="1000" b="0" i="0" u="none" strike="noStrike">
+                        <a:solidFill>
+                          <a:srgbClr val="000000"/>
+                        </a:solidFill>
+                        <a:effectLst/>
+                        <a:latin typeface="Helvetica" pitchFamily="2" charset="0"/>
+                      </a:endParaRPr>
+                    </a:p>
+                  </a:txBody>
+                  <a:tcPr marL="8543" marR="8543" marT="8543" marB="0" anchor="b"/>
+                </a:tc>
+                <a:tc>
+                  <a:txBody>
+                    <a:bodyPr/>
+                    <a:lstStyle/>
+                    <a:p>
+                      <a:pPr algn="r" fontAlgn="b"/>
+                      <a:r>
+                        <a:rPr lang="en-US" sz="1000" u="none" strike="noStrike">
+                          <a:effectLst/>
+                        </a:rPr>
+                        <a:t>5.95</a:t>
+                      </a:r>
+                      <a:endParaRPr lang="en-US" sz="1000" b="0" i="0" u="none" strike="noStrike">
+                        <a:solidFill>
+                          <a:srgbClr val="000000"/>
+                        </a:solidFill>
+                        <a:effectLst/>
+                        <a:latin typeface="Helvetica" pitchFamily="2" charset="0"/>
+                      </a:endParaRPr>
+                    </a:p>
+                  </a:txBody>
+                  <a:tcPr marL="8543" marR="8543" marT="8543" marB="0" anchor="b"/>
+                </a:tc>
+                <a:extLst>
+                  <a:ext uri="{0D108BD9-81ED-4DB2-BD59-A6C34878D82A}">
+                    <a16:rowId xmlns:a16="http://schemas.microsoft.com/office/drawing/2014/main" val="987450065"/>
+                  </a:ext>
+                </a:extLst>
+              </a:tr>
+              <a:tr h="191698">
+                <a:tc>
+                  <a:txBody>
+                    <a:bodyPr/>
+                    <a:lstStyle/>
+                    <a:p>
+                      <a:pPr algn="l" fontAlgn="b"/>
+                      <a:r>
+                        <a:rPr lang="en-US" sz="1000" u="none" strike="noStrike">
+                          <a:effectLst/>
+                        </a:rPr>
+                        <a:t>Spain</a:t>
+                      </a:r>
+                      <a:endParaRPr lang="en-US" sz="1000" b="0" i="0" u="none" strike="noStrike">
+                        <a:solidFill>
+                          <a:srgbClr val="000000"/>
+                        </a:solidFill>
+                        <a:effectLst/>
+                        <a:latin typeface="Helvetica" pitchFamily="2" charset="0"/>
+                      </a:endParaRPr>
+                    </a:p>
+                  </a:txBody>
+                  <a:tcPr marL="8543" marR="8543" marT="8543" marB="0" anchor="b"/>
+                </a:tc>
+                <a:tc>
+                  <a:txBody>
+                    <a:bodyPr/>
+                    <a:lstStyle/>
+                    <a:p>
+                      <a:pPr algn="r" fontAlgn="b"/>
+                      <a:r>
+                        <a:rPr lang="en-US" sz="1000" u="none" strike="noStrike">
+                          <a:effectLst/>
+                        </a:rPr>
+                        <a:t>14</a:t>
+                      </a:r>
+                      <a:endParaRPr lang="en-US" sz="1000" b="0" i="0" u="none" strike="noStrike">
+                        <a:solidFill>
+                          <a:srgbClr val="000000"/>
+                        </a:solidFill>
+                        <a:effectLst/>
+                        <a:latin typeface="Helvetica" pitchFamily="2" charset="0"/>
+                      </a:endParaRPr>
+                    </a:p>
+                  </a:txBody>
+                  <a:tcPr marL="8543" marR="8543" marT="8543" marB="0" anchor="b"/>
+                </a:tc>
+                <a:tc>
+                  <a:txBody>
+                    <a:bodyPr/>
+                    <a:lstStyle/>
+                    <a:p>
+                      <a:pPr algn="l" fontAlgn="b"/>
+                      <a:r>
+                        <a:rPr lang="en-US" sz="1000" u="none" strike="noStrike">
+                          <a:effectLst/>
+                        </a:rPr>
+                        <a:t> $   3,392,942.86 </a:t>
+                      </a:r>
+                      <a:endParaRPr lang="en-US" sz="1000" b="0" i="0" u="none" strike="noStrike">
+                        <a:solidFill>
+                          <a:srgbClr val="000000"/>
+                        </a:solidFill>
+                        <a:effectLst/>
+                        <a:latin typeface="Helvetica" pitchFamily="2" charset="0"/>
+                      </a:endParaRPr>
+                    </a:p>
+                  </a:txBody>
+                  <a:tcPr marL="8543" marR="8543" marT="8543" marB="0" anchor="b"/>
+                </a:tc>
+                <a:tc>
+                  <a:txBody>
+                    <a:bodyPr/>
+                    <a:lstStyle/>
+                    <a:p>
+                      <a:pPr algn="r" fontAlgn="b"/>
+                      <a:r>
+                        <a:rPr lang="en-US" sz="1000" u="none" strike="noStrike">
+                          <a:effectLst/>
+                        </a:rPr>
+                        <a:t>5.41</a:t>
+                      </a:r>
+                      <a:endParaRPr lang="en-US" sz="1000" b="0" i="0" u="none" strike="noStrike">
+                        <a:solidFill>
+                          <a:srgbClr val="000000"/>
+                        </a:solidFill>
+                        <a:effectLst/>
+                        <a:latin typeface="Helvetica" pitchFamily="2" charset="0"/>
+                      </a:endParaRPr>
+                    </a:p>
+                  </a:txBody>
+                  <a:tcPr marL="8543" marR="8543" marT="8543" marB="0" anchor="b"/>
+                </a:tc>
+                <a:extLst>
+                  <a:ext uri="{0D108BD9-81ED-4DB2-BD59-A6C34878D82A}">
+                    <a16:rowId xmlns:a16="http://schemas.microsoft.com/office/drawing/2014/main" val="428184416"/>
+                  </a:ext>
+                </a:extLst>
+              </a:tr>
+              <a:tr h="191698">
+                <a:tc>
+                  <a:txBody>
+                    <a:bodyPr/>
+                    <a:lstStyle/>
+                    <a:p>
+                      <a:pPr algn="l" fontAlgn="b"/>
+                      <a:r>
+                        <a:rPr lang="en-US" sz="1000" u="none" strike="noStrike">
+                          <a:effectLst/>
+                        </a:rPr>
+                        <a:t>Italy</a:t>
+                      </a:r>
+                      <a:endParaRPr lang="en-US" sz="1000" b="0" i="0" u="none" strike="noStrike">
+                        <a:solidFill>
+                          <a:srgbClr val="000000"/>
+                        </a:solidFill>
+                        <a:effectLst/>
+                        <a:latin typeface="Helvetica" pitchFamily="2" charset="0"/>
+                      </a:endParaRPr>
+                    </a:p>
+                  </a:txBody>
+                  <a:tcPr marL="8543" marR="8543" marT="8543" marB="0" anchor="b"/>
+                </a:tc>
+                <a:tc>
+                  <a:txBody>
+                    <a:bodyPr/>
+                    <a:lstStyle/>
+                    <a:p>
+                      <a:pPr algn="r" fontAlgn="b"/>
+                      <a:r>
+                        <a:rPr lang="en-US" sz="1000" u="none" strike="noStrike">
+                          <a:effectLst/>
+                        </a:rPr>
+                        <a:t>10</a:t>
+                      </a:r>
+                      <a:endParaRPr lang="en-US" sz="1000" b="0" i="0" u="none" strike="noStrike">
+                        <a:solidFill>
+                          <a:srgbClr val="000000"/>
+                        </a:solidFill>
+                        <a:effectLst/>
+                        <a:latin typeface="Helvetica" pitchFamily="2" charset="0"/>
+                      </a:endParaRPr>
+                    </a:p>
+                  </a:txBody>
+                  <a:tcPr marL="8543" marR="8543" marT="8543" marB="0" anchor="b"/>
+                </a:tc>
+                <a:tc>
+                  <a:txBody>
+                    <a:bodyPr/>
+                    <a:lstStyle/>
+                    <a:p>
+                      <a:pPr algn="l" fontAlgn="b"/>
+                      <a:r>
+                        <a:rPr lang="en-US" sz="1000" u="none" strike="noStrike">
+                          <a:effectLst/>
+                        </a:rPr>
+                        <a:t> $      671,150.00 </a:t>
+                      </a:r>
+                      <a:endParaRPr lang="en-US" sz="1000" b="0" i="0" u="none" strike="noStrike">
+                        <a:solidFill>
+                          <a:srgbClr val="000000"/>
+                        </a:solidFill>
+                        <a:effectLst/>
+                        <a:latin typeface="Helvetica" pitchFamily="2" charset="0"/>
+                      </a:endParaRPr>
+                    </a:p>
+                  </a:txBody>
+                  <a:tcPr marL="8543" marR="8543" marT="8543" marB="0" anchor="b"/>
+                </a:tc>
+                <a:tc>
+                  <a:txBody>
+                    <a:bodyPr/>
+                    <a:lstStyle/>
+                    <a:p>
+                      <a:pPr algn="r" fontAlgn="b"/>
+                      <a:r>
+                        <a:rPr lang="en-US" sz="1000" u="none" strike="noStrike">
+                          <a:effectLst/>
+                        </a:rPr>
+                        <a:t>5.39</a:t>
+                      </a:r>
+                      <a:endParaRPr lang="en-US" sz="1000" b="0" i="0" u="none" strike="noStrike">
+                        <a:solidFill>
+                          <a:srgbClr val="000000"/>
+                        </a:solidFill>
+                        <a:effectLst/>
+                        <a:latin typeface="Helvetica" pitchFamily="2" charset="0"/>
+                      </a:endParaRPr>
+                    </a:p>
+                  </a:txBody>
+                  <a:tcPr marL="8543" marR="8543" marT="8543" marB="0" anchor="b"/>
+                </a:tc>
+                <a:extLst>
+                  <a:ext uri="{0D108BD9-81ED-4DB2-BD59-A6C34878D82A}">
+                    <a16:rowId xmlns:a16="http://schemas.microsoft.com/office/drawing/2014/main" val="320946248"/>
+                  </a:ext>
+                </a:extLst>
+              </a:tr>
+              <a:tr h="191698">
+                <a:tc>
+                  <a:txBody>
+                    <a:bodyPr/>
+                    <a:lstStyle/>
+                    <a:p>
+                      <a:pPr algn="l" fontAlgn="b"/>
+                      <a:r>
+                        <a:rPr lang="en-US" sz="1000" u="none" strike="noStrike">
+                          <a:effectLst/>
+                        </a:rPr>
+                        <a:t>France</a:t>
+                      </a:r>
+                      <a:endParaRPr lang="en-US" sz="1000" b="0" i="0" u="none" strike="noStrike">
+                        <a:solidFill>
+                          <a:srgbClr val="000000"/>
+                        </a:solidFill>
+                        <a:effectLst/>
+                        <a:latin typeface="Helvetica" pitchFamily="2" charset="0"/>
+                      </a:endParaRPr>
+                    </a:p>
+                  </a:txBody>
+                  <a:tcPr marL="8543" marR="8543" marT="8543" marB="0" anchor="b"/>
+                </a:tc>
+                <a:tc>
+                  <a:txBody>
+                    <a:bodyPr/>
+                    <a:lstStyle/>
+                    <a:p>
+                      <a:pPr algn="r" fontAlgn="b"/>
+                      <a:r>
+                        <a:rPr lang="en-US" sz="1000" u="none" strike="noStrike">
+                          <a:effectLst/>
+                        </a:rPr>
+                        <a:t>12</a:t>
+                      </a:r>
+                      <a:endParaRPr lang="en-US" sz="1000" b="0" i="0" u="none" strike="noStrike">
+                        <a:solidFill>
+                          <a:srgbClr val="000000"/>
+                        </a:solidFill>
+                        <a:effectLst/>
+                        <a:latin typeface="Helvetica" pitchFamily="2" charset="0"/>
+                      </a:endParaRPr>
+                    </a:p>
+                  </a:txBody>
+                  <a:tcPr marL="8543" marR="8543" marT="8543" marB="0" anchor="b"/>
+                </a:tc>
+                <a:tc>
+                  <a:txBody>
+                    <a:bodyPr/>
+                    <a:lstStyle/>
+                    <a:p>
+                      <a:pPr algn="l" fontAlgn="b"/>
+                      <a:r>
+                        <a:rPr lang="en-US" sz="1000" u="none" strike="noStrike">
+                          <a:effectLst/>
+                        </a:rPr>
+                        <a:t> $   3,508,227.17 </a:t>
+                      </a:r>
+                      <a:endParaRPr lang="en-US" sz="1000" b="0" i="0" u="none" strike="noStrike">
+                        <a:solidFill>
+                          <a:srgbClr val="000000"/>
+                        </a:solidFill>
+                        <a:effectLst/>
+                        <a:latin typeface="Helvetica" pitchFamily="2" charset="0"/>
+                      </a:endParaRPr>
+                    </a:p>
+                  </a:txBody>
+                  <a:tcPr marL="8543" marR="8543" marT="8543" marB="0" anchor="b"/>
+                </a:tc>
+                <a:tc>
+                  <a:txBody>
+                    <a:bodyPr/>
+                    <a:lstStyle/>
+                    <a:p>
+                      <a:pPr algn="r" fontAlgn="b"/>
+                      <a:r>
+                        <a:rPr lang="en-US" sz="1000" u="none" strike="noStrike">
+                          <a:effectLst/>
+                        </a:rPr>
+                        <a:t>5.20</a:t>
+                      </a:r>
+                      <a:endParaRPr lang="en-US" sz="1000" b="0" i="0" u="none" strike="noStrike">
+                        <a:solidFill>
+                          <a:srgbClr val="000000"/>
+                        </a:solidFill>
+                        <a:effectLst/>
+                        <a:latin typeface="Helvetica" pitchFamily="2" charset="0"/>
+                      </a:endParaRPr>
+                    </a:p>
+                  </a:txBody>
+                  <a:tcPr marL="8543" marR="8543" marT="8543" marB="0" anchor="b"/>
+                </a:tc>
+                <a:extLst>
+                  <a:ext uri="{0D108BD9-81ED-4DB2-BD59-A6C34878D82A}">
+                    <a16:rowId xmlns:a16="http://schemas.microsoft.com/office/drawing/2014/main" val="3936084000"/>
+                  </a:ext>
+                </a:extLst>
+              </a:tr>
+              <a:tr h="191698">
+                <a:tc>
+                  <a:txBody>
+                    <a:bodyPr/>
+                    <a:lstStyle/>
+                    <a:p>
+                      <a:pPr algn="l" fontAlgn="b"/>
+                      <a:r>
+                        <a:rPr lang="en-US" sz="1000" u="none" strike="noStrike">
+                          <a:effectLst/>
+                        </a:rPr>
+                        <a:t>USA</a:t>
+                      </a:r>
+                      <a:endParaRPr lang="en-US" sz="1000" b="0" i="0" u="none" strike="noStrike">
+                        <a:solidFill>
+                          <a:srgbClr val="000000"/>
+                        </a:solidFill>
+                        <a:effectLst/>
+                        <a:latin typeface="Helvetica" pitchFamily="2" charset="0"/>
+                      </a:endParaRPr>
+                    </a:p>
+                  </a:txBody>
+                  <a:tcPr marL="8543" marR="8543" marT="8543" marB="0" anchor="b"/>
+                </a:tc>
+                <a:tc>
+                  <a:txBody>
+                    <a:bodyPr/>
+                    <a:lstStyle/>
+                    <a:p>
+                      <a:pPr algn="r" fontAlgn="b"/>
+                      <a:r>
+                        <a:rPr lang="en-US" sz="1000" u="none" strike="noStrike">
+                          <a:effectLst/>
+                        </a:rPr>
+                        <a:t>769</a:t>
+                      </a:r>
+                      <a:endParaRPr lang="en-US" sz="1000" b="0" i="0" u="none" strike="noStrike">
+                        <a:solidFill>
+                          <a:srgbClr val="000000"/>
+                        </a:solidFill>
+                        <a:effectLst/>
+                        <a:latin typeface="Helvetica" pitchFamily="2" charset="0"/>
+                      </a:endParaRPr>
+                    </a:p>
+                  </a:txBody>
+                  <a:tcPr marL="8543" marR="8543" marT="8543" marB="0" anchor="b"/>
+                </a:tc>
+                <a:tc>
+                  <a:txBody>
+                    <a:bodyPr/>
+                    <a:lstStyle/>
+                    <a:p>
+                      <a:pPr algn="l" fontAlgn="b"/>
+                      <a:r>
+                        <a:rPr lang="en-US" sz="1000" u="none" strike="noStrike">
+                          <a:effectLst/>
+                        </a:rPr>
+                        <a:t> $   4,479,284.94 </a:t>
+                      </a:r>
+                      <a:endParaRPr lang="en-US" sz="1000" b="0" i="0" u="none" strike="noStrike">
+                        <a:solidFill>
+                          <a:srgbClr val="000000"/>
+                        </a:solidFill>
+                        <a:effectLst/>
+                        <a:latin typeface="Helvetica" pitchFamily="2" charset="0"/>
+                      </a:endParaRPr>
+                    </a:p>
+                  </a:txBody>
+                  <a:tcPr marL="8543" marR="8543" marT="8543" marB="0" anchor="b"/>
+                </a:tc>
+                <a:tc>
+                  <a:txBody>
+                    <a:bodyPr/>
+                    <a:lstStyle/>
+                    <a:p>
+                      <a:pPr algn="r" fontAlgn="b"/>
+                      <a:r>
+                        <a:rPr lang="en-US" sz="1000" u="none" strike="noStrike">
+                          <a:effectLst/>
+                        </a:rPr>
+                        <a:t>5.11</a:t>
+                      </a:r>
+                      <a:endParaRPr lang="en-US" sz="1000" b="0" i="0" u="none" strike="noStrike">
+                        <a:solidFill>
+                          <a:srgbClr val="000000"/>
+                        </a:solidFill>
+                        <a:effectLst/>
+                        <a:latin typeface="Helvetica" pitchFamily="2" charset="0"/>
+                      </a:endParaRPr>
+                    </a:p>
+                  </a:txBody>
+                  <a:tcPr marL="8543" marR="8543" marT="8543" marB="0" anchor="b"/>
+                </a:tc>
+                <a:extLst>
+                  <a:ext uri="{0D108BD9-81ED-4DB2-BD59-A6C34878D82A}">
+                    <a16:rowId xmlns:a16="http://schemas.microsoft.com/office/drawing/2014/main" val="3671579371"/>
+                  </a:ext>
+                </a:extLst>
+              </a:tr>
+              <a:tr h="191698">
+                <a:tc>
+                  <a:txBody>
+                    <a:bodyPr/>
+                    <a:lstStyle/>
+                    <a:p>
+                      <a:pPr algn="l" fontAlgn="b"/>
+                      <a:r>
+                        <a:rPr lang="en-US" sz="1000" u="none" strike="noStrike">
+                          <a:effectLst/>
+                        </a:rPr>
+                        <a:t>Mexico</a:t>
+                      </a:r>
+                      <a:endParaRPr lang="en-US" sz="1000" b="0" i="0" u="none" strike="noStrike">
+                        <a:solidFill>
+                          <a:srgbClr val="000000"/>
+                        </a:solidFill>
+                        <a:effectLst/>
+                        <a:latin typeface="Helvetica" pitchFamily="2" charset="0"/>
+                      </a:endParaRPr>
+                    </a:p>
+                  </a:txBody>
+                  <a:tcPr marL="8543" marR="8543" marT="8543" marB="0" anchor="b"/>
+                </a:tc>
+                <a:tc>
+                  <a:txBody>
+                    <a:bodyPr/>
+                    <a:lstStyle/>
+                    <a:p>
+                      <a:pPr algn="r" fontAlgn="b"/>
+                      <a:r>
+                        <a:rPr lang="en-US" sz="1000" u="none" strike="noStrike">
+                          <a:effectLst/>
+                        </a:rPr>
+                        <a:t>9</a:t>
+                      </a:r>
+                      <a:endParaRPr lang="en-US" sz="1000" b="0" i="0" u="none" strike="noStrike">
+                        <a:solidFill>
+                          <a:srgbClr val="000000"/>
+                        </a:solidFill>
+                        <a:effectLst/>
+                        <a:latin typeface="Helvetica" pitchFamily="2" charset="0"/>
+                      </a:endParaRPr>
+                    </a:p>
+                  </a:txBody>
+                  <a:tcPr marL="8543" marR="8543" marT="8543" marB="0" anchor="b"/>
+                </a:tc>
+                <a:tc>
+                  <a:txBody>
+                    <a:bodyPr/>
+                    <a:lstStyle/>
+                    <a:p>
+                      <a:pPr algn="l" fontAlgn="b"/>
+                      <a:r>
+                        <a:rPr lang="en-US" sz="1000" u="none" strike="noStrike">
+                          <a:effectLst/>
+                        </a:rPr>
+                        <a:t> $   2,809,111.11 </a:t>
+                      </a:r>
+                      <a:endParaRPr lang="en-US" sz="1000" b="0" i="0" u="none" strike="noStrike">
+                        <a:solidFill>
+                          <a:srgbClr val="000000"/>
+                        </a:solidFill>
+                        <a:effectLst/>
+                        <a:latin typeface="Helvetica" pitchFamily="2" charset="0"/>
+                      </a:endParaRPr>
+                    </a:p>
+                  </a:txBody>
+                  <a:tcPr marL="8543" marR="8543" marT="8543" marB="0" anchor="b"/>
+                </a:tc>
+                <a:tc>
+                  <a:txBody>
+                    <a:bodyPr/>
+                    <a:lstStyle/>
+                    <a:p>
+                      <a:pPr algn="r" fontAlgn="b"/>
+                      <a:r>
+                        <a:rPr lang="en-US" sz="1000" u="none" strike="noStrike">
+                          <a:effectLst/>
+                        </a:rPr>
+                        <a:t>5.11</a:t>
+                      </a:r>
+                      <a:endParaRPr lang="en-US" sz="1000" b="0" i="0" u="none" strike="noStrike">
+                        <a:solidFill>
+                          <a:srgbClr val="000000"/>
+                        </a:solidFill>
+                        <a:effectLst/>
+                        <a:latin typeface="Helvetica" pitchFamily="2" charset="0"/>
+                      </a:endParaRPr>
+                    </a:p>
+                  </a:txBody>
+                  <a:tcPr marL="8543" marR="8543" marT="8543" marB="0" anchor="b"/>
+                </a:tc>
+                <a:extLst>
+                  <a:ext uri="{0D108BD9-81ED-4DB2-BD59-A6C34878D82A}">
+                    <a16:rowId xmlns:a16="http://schemas.microsoft.com/office/drawing/2014/main" val="3258920361"/>
+                  </a:ext>
+                </a:extLst>
+              </a:tr>
+              <a:tr h="191698">
+                <a:tc>
+                  <a:txBody>
+                    <a:bodyPr/>
+                    <a:lstStyle/>
+                    <a:p>
+                      <a:pPr algn="l" fontAlgn="b"/>
+                      <a:r>
+                        <a:rPr lang="en-US" sz="1000" u="none" strike="noStrike">
+                          <a:effectLst/>
+                        </a:rPr>
+                        <a:t>UK</a:t>
+                      </a:r>
+                      <a:endParaRPr lang="en-US" sz="1000" b="0" i="0" u="none" strike="noStrike">
+                        <a:solidFill>
+                          <a:srgbClr val="000000"/>
+                        </a:solidFill>
+                        <a:effectLst/>
+                        <a:latin typeface="Helvetica" pitchFamily="2" charset="0"/>
+                      </a:endParaRPr>
+                    </a:p>
+                  </a:txBody>
+                  <a:tcPr marL="8543" marR="8543" marT="8543" marB="0" anchor="b"/>
+                </a:tc>
+                <a:tc>
+                  <a:txBody>
+                    <a:bodyPr/>
+                    <a:lstStyle/>
+                    <a:p>
+                      <a:pPr algn="r" fontAlgn="b"/>
+                      <a:r>
+                        <a:rPr lang="en-US" sz="1000" u="none" strike="noStrike">
+                          <a:effectLst/>
+                        </a:rPr>
+                        <a:t>79</a:t>
+                      </a:r>
+                      <a:endParaRPr lang="en-US" sz="1000" b="0" i="0" u="none" strike="noStrike">
+                        <a:solidFill>
+                          <a:srgbClr val="000000"/>
+                        </a:solidFill>
+                        <a:effectLst/>
+                        <a:latin typeface="Helvetica" pitchFamily="2" charset="0"/>
+                      </a:endParaRPr>
+                    </a:p>
+                  </a:txBody>
+                  <a:tcPr marL="8543" marR="8543" marT="8543" marB="0" anchor="b"/>
+                </a:tc>
+                <a:tc>
+                  <a:txBody>
+                    <a:bodyPr/>
+                    <a:lstStyle/>
+                    <a:p>
+                      <a:pPr algn="l" fontAlgn="b"/>
+                      <a:r>
+                        <a:rPr lang="en-US" sz="1000" u="none" strike="noStrike">
+                          <a:effectLst/>
+                        </a:rPr>
+                        <a:t> $   1,053,899.28 </a:t>
+                      </a:r>
+                      <a:endParaRPr lang="en-US" sz="1000" b="0" i="0" u="none" strike="noStrike">
+                        <a:solidFill>
+                          <a:srgbClr val="000000"/>
+                        </a:solidFill>
+                        <a:effectLst/>
+                        <a:latin typeface="Helvetica" pitchFamily="2" charset="0"/>
+                      </a:endParaRPr>
+                    </a:p>
+                  </a:txBody>
+                  <a:tcPr marL="8543" marR="8543" marT="8543" marB="0" anchor="b"/>
+                </a:tc>
+                <a:tc>
+                  <a:txBody>
+                    <a:bodyPr/>
+                    <a:lstStyle/>
+                    <a:p>
+                      <a:pPr algn="r" fontAlgn="b"/>
+                      <a:r>
+                        <a:rPr lang="en-US" sz="1000" u="none" strike="noStrike">
+                          <a:effectLst/>
+                        </a:rPr>
+                        <a:t>5.07</a:t>
+                      </a:r>
+                      <a:endParaRPr lang="en-US" sz="1000" b="0" i="0" u="none" strike="noStrike">
+                        <a:solidFill>
+                          <a:srgbClr val="000000"/>
+                        </a:solidFill>
+                        <a:effectLst/>
+                        <a:latin typeface="Helvetica" pitchFamily="2" charset="0"/>
+                      </a:endParaRPr>
+                    </a:p>
+                  </a:txBody>
+                  <a:tcPr marL="8543" marR="8543" marT="8543" marB="0" anchor="b"/>
+                </a:tc>
+                <a:extLst>
+                  <a:ext uri="{0D108BD9-81ED-4DB2-BD59-A6C34878D82A}">
+                    <a16:rowId xmlns:a16="http://schemas.microsoft.com/office/drawing/2014/main" val="761165780"/>
+                  </a:ext>
+                </a:extLst>
+              </a:tr>
+              <a:tr h="191698">
+                <a:tc>
+                  <a:txBody>
+                    <a:bodyPr/>
+                    <a:lstStyle/>
+                    <a:p>
+                      <a:pPr algn="l" fontAlgn="b"/>
+                      <a:r>
+                        <a:rPr lang="en-US" sz="1000" u="none" strike="noStrike">
+                          <a:effectLst/>
+                        </a:rPr>
+                        <a:t>Canada</a:t>
+                      </a:r>
+                      <a:endParaRPr lang="en-US" sz="1000" b="0" i="0" u="none" strike="noStrike">
+                        <a:solidFill>
+                          <a:srgbClr val="000000"/>
+                        </a:solidFill>
+                        <a:effectLst/>
+                        <a:latin typeface="Helvetica" pitchFamily="2" charset="0"/>
+                      </a:endParaRPr>
+                    </a:p>
+                  </a:txBody>
+                  <a:tcPr marL="8543" marR="8543" marT="8543" marB="0" anchor="b"/>
+                </a:tc>
+                <a:tc>
+                  <a:txBody>
+                    <a:bodyPr/>
+                    <a:lstStyle/>
+                    <a:p>
+                      <a:pPr algn="r" fontAlgn="b"/>
+                      <a:r>
+                        <a:rPr lang="en-US" sz="1000" u="none" strike="noStrike">
+                          <a:effectLst/>
+                        </a:rPr>
+                        <a:t>22</a:t>
+                      </a:r>
+                      <a:endParaRPr lang="en-US" sz="1000" b="0" i="0" u="none" strike="noStrike">
+                        <a:solidFill>
+                          <a:srgbClr val="000000"/>
+                        </a:solidFill>
+                        <a:effectLst/>
+                        <a:latin typeface="Helvetica" pitchFamily="2" charset="0"/>
+                      </a:endParaRPr>
+                    </a:p>
+                  </a:txBody>
+                  <a:tcPr marL="8543" marR="8543" marT="8543" marB="0" anchor="b"/>
+                </a:tc>
+                <a:tc>
+                  <a:txBody>
+                    <a:bodyPr/>
+                    <a:lstStyle/>
+                    <a:p>
+                      <a:pPr algn="l" fontAlgn="b"/>
+                      <a:r>
+                        <a:rPr lang="en-US" sz="1000" u="none" strike="noStrike">
+                          <a:effectLst/>
+                        </a:rPr>
+                        <a:t> $      553,251.41 </a:t>
+                      </a:r>
+                      <a:endParaRPr lang="en-US" sz="1000" b="0" i="0" u="none" strike="noStrike">
+                        <a:solidFill>
+                          <a:srgbClr val="000000"/>
+                        </a:solidFill>
+                        <a:effectLst/>
+                        <a:latin typeface="Helvetica" pitchFamily="2" charset="0"/>
+                      </a:endParaRPr>
+                    </a:p>
+                  </a:txBody>
+                  <a:tcPr marL="8543" marR="8543" marT="8543" marB="0" anchor="b"/>
+                </a:tc>
+                <a:tc>
+                  <a:txBody>
+                    <a:bodyPr/>
+                    <a:lstStyle/>
+                    <a:p>
+                      <a:pPr algn="r" fontAlgn="b"/>
+                      <a:r>
+                        <a:rPr lang="en-US" sz="1000" u="none" strike="noStrike">
+                          <a:effectLst/>
+                        </a:rPr>
+                        <a:t>5.05</a:t>
+                      </a:r>
+                      <a:endParaRPr lang="en-US" sz="1000" b="0" i="0" u="none" strike="noStrike">
+                        <a:solidFill>
+                          <a:srgbClr val="000000"/>
+                        </a:solidFill>
+                        <a:effectLst/>
+                        <a:latin typeface="Helvetica" pitchFamily="2" charset="0"/>
+                      </a:endParaRPr>
+                    </a:p>
+                  </a:txBody>
+                  <a:tcPr marL="8543" marR="8543" marT="8543" marB="0" anchor="b"/>
+                </a:tc>
+                <a:extLst>
+                  <a:ext uri="{0D108BD9-81ED-4DB2-BD59-A6C34878D82A}">
+                    <a16:rowId xmlns:a16="http://schemas.microsoft.com/office/drawing/2014/main" val="2322936043"/>
+                  </a:ext>
+                </a:extLst>
+              </a:tr>
+              <a:tr h="191698">
+                <a:tc>
+                  <a:txBody>
+                    <a:bodyPr/>
+                    <a:lstStyle/>
+                    <a:p>
+                      <a:pPr algn="l" fontAlgn="b"/>
+                      <a:r>
+                        <a:rPr lang="en-US" sz="1000" u="none" strike="noStrike">
+                          <a:effectLst/>
+                        </a:rPr>
+                        <a:t>Russia</a:t>
+                      </a:r>
+                      <a:endParaRPr lang="en-US" sz="1000" b="0" i="0" u="none" strike="noStrike">
+                        <a:solidFill>
+                          <a:srgbClr val="000000"/>
+                        </a:solidFill>
+                        <a:effectLst/>
+                        <a:latin typeface="Helvetica" pitchFamily="2" charset="0"/>
+                      </a:endParaRPr>
+                    </a:p>
+                  </a:txBody>
+                  <a:tcPr marL="8543" marR="8543" marT="8543" marB="0" anchor="b"/>
+                </a:tc>
+                <a:tc>
+                  <a:txBody>
+                    <a:bodyPr/>
+                    <a:lstStyle/>
+                    <a:p>
+                      <a:pPr algn="r" fontAlgn="b"/>
+                      <a:r>
+                        <a:rPr lang="en-US" sz="1000" u="none" strike="noStrike">
+                          <a:effectLst/>
+                        </a:rPr>
+                        <a:t>18</a:t>
+                      </a:r>
+                      <a:endParaRPr lang="en-US" sz="1000" b="0" i="0" u="none" strike="noStrike">
+                        <a:solidFill>
+                          <a:srgbClr val="000000"/>
+                        </a:solidFill>
+                        <a:effectLst/>
+                        <a:latin typeface="Helvetica" pitchFamily="2" charset="0"/>
+                      </a:endParaRPr>
+                    </a:p>
+                  </a:txBody>
+                  <a:tcPr marL="8543" marR="8543" marT="8543" marB="0" anchor="b"/>
+                </a:tc>
+                <a:tc>
+                  <a:txBody>
+                    <a:bodyPr/>
+                    <a:lstStyle/>
+                    <a:p>
+                      <a:pPr algn="l" fontAlgn="b"/>
+                      <a:r>
+                        <a:rPr lang="en-US" sz="1000" u="none" strike="noStrike">
+                          <a:effectLst/>
+                        </a:rPr>
+                        <a:t> $ 16,993,718.06 </a:t>
+                      </a:r>
+                      <a:endParaRPr lang="en-US" sz="1000" b="0" i="0" u="none" strike="noStrike">
+                        <a:solidFill>
+                          <a:srgbClr val="000000"/>
+                        </a:solidFill>
+                        <a:effectLst/>
+                        <a:latin typeface="Helvetica" pitchFamily="2" charset="0"/>
+                      </a:endParaRPr>
+                    </a:p>
+                  </a:txBody>
+                  <a:tcPr marL="8543" marR="8543" marT="8543" marB="0" anchor="b"/>
+                </a:tc>
+                <a:tc>
+                  <a:txBody>
+                    <a:bodyPr/>
+                    <a:lstStyle/>
+                    <a:p>
+                      <a:pPr algn="r" fontAlgn="b"/>
+                      <a:r>
+                        <a:rPr lang="en-US" sz="1000" u="none" strike="noStrike">
+                          <a:effectLst/>
+                        </a:rPr>
+                        <a:t>4.81</a:t>
+                      </a:r>
+                      <a:endParaRPr lang="en-US" sz="1000" b="0" i="0" u="none" strike="noStrike">
+                        <a:solidFill>
+                          <a:srgbClr val="000000"/>
+                        </a:solidFill>
+                        <a:effectLst/>
+                        <a:latin typeface="Helvetica" pitchFamily="2" charset="0"/>
+                      </a:endParaRPr>
+                    </a:p>
+                  </a:txBody>
+                  <a:tcPr marL="8543" marR="8543" marT="8543" marB="0" anchor="b"/>
+                </a:tc>
+                <a:extLst>
+                  <a:ext uri="{0D108BD9-81ED-4DB2-BD59-A6C34878D82A}">
+                    <a16:rowId xmlns:a16="http://schemas.microsoft.com/office/drawing/2014/main" val="290732014"/>
+                  </a:ext>
+                </a:extLst>
+              </a:tr>
+              <a:tr h="191698">
+                <a:tc>
+                  <a:txBody>
+                    <a:bodyPr/>
+                    <a:lstStyle/>
+                    <a:p>
+                      <a:pPr algn="l" fontAlgn="b"/>
+                      <a:r>
+                        <a:rPr lang="en-US" sz="1000" u="none" strike="noStrike">
+                          <a:effectLst/>
+                        </a:rPr>
+                        <a:t>Philippines</a:t>
+                      </a:r>
+                      <a:endParaRPr lang="en-US" sz="1000" b="0" i="0" u="none" strike="noStrike">
+                        <a:solidFill>
+                          <a:srgbClr val="000000"/>
+                        </a:solidFill>
+                        <a:effectLst/>
+                        <a:latin typeface="Helvetica" pitchFamily="2" charset="0"/>
+                      </a:endParaRPr>
+                    </a:p>
+                  </a:txBody>
+                  <a:tcPr marL="8543" marR="8543" marT="8543" marB="0" anchor="b"/>
+                </a:tc>
+                <a:tc>
+                  <a:txBody>
+                    <a:bodyPr/>
+                    <a:lstStyle/>
+                    <a:p>
+                      <a:pPr algn="r" fontAlgn="b"/>
+                      <a:r>
+                        <a:rPr lang="en-US" sz="1000" u="none" strike="noStrike">
+                          <a:effectLst/>
+                        </a:rPr>
+                        <a:t>14</a:t>
+                      </a:r>
+                      <a:endParaRPr lang="en-US" sz="1000" b="0" i="0" u="none" strike="noStrike">
+                        <a:solidFill>
+                          <a:srgbClr val="000000"/>
+                        </a:solidFill>
+                        <a:effectLst/>
+                        <a:latin typeface="Helvetica" pitchFamily="2" charset="0"/>
+                      </a:endParaRPr>
+                    </a:p>
+                  </a:txBody>
+                  <a:tcPr marL="8543" marR="8543" marT="8543" marB="0" anchor="b"/>
+                </a:tc>
+                <a:tc>
+                  <a:txBody>
+                    <a:bodyPr/>
+                    <a:lstStyle/>
+                    <a:p>
+                      <a:pPr algn="l" fontAlgn="b"/>
+                      <a:r>
+                        <a:rPr lang="en-US" sz="1000" u="none" strike="noStrike">
+                          <a:effectLst/>
+                        </a:rPr>
+                        <a:t> $   8,795,928.57 </a:t>
+                      </a:r>
+                      <a:endParaRPr lang="en-US" sz="1000" b="0" i="0" u="none" strike="noStrike">
+                        <a:solidFill>
+                          <a:srgbClr val="000000"/>
+                        </a:solidFill>
+                        <a:effectLst/>
+                        <a:latin typeface="Helvetica" pitchFamily="2" charset="0"/>
+                      </a:endParaRPr>
+                    </a:p>
+                  </a:txBody>
+                  <a:tcPr marL="8543" marR="8543" marT="8543" marB="0" anchor="b"/>
+                </a:tc>
+                <a:tc>
+                  <a:txBody>
+                    <a:bodyPr/>
+                    <a:lstStyle/>
+                    <a:p>
+                      <a:pPr algn="r" fontAlgn="b"/>
+                      <a:r>
+                        <a:rPr lang="en-US" sz="1000" u="none" strike="noStrike">
+                          <a:effectLst/>
+                        </a:rPr>
+                        <a:t>4.75</a:t>
+                      </a:r>
+                      <a:endParaRPr lang="en-US" sz="1000" b="0" i="0" u="none" strike="noStrike">
+                        <a:solidFill>
+                          <a:srgbClr val="000000"/>
+                        </a:solidFill>
+                        <a:effectLst/>
+                        <a:latin typeface="Helvetica" pitchFamily="2" charset="0"/>
+                      </a:endParaRPr>
+                    </a:p>
+                  </a:txBody>
+                  <a:tcPr marL="8543" marR="8543" marT="8543" marB="0" anchor="b"/>
+                </a:tc>
+                <a:extLst>
+                  <a:ext uri="{0D108BD9-81ED-4DB2-BD59-A6C34878D82A}">
+                    <a16:rowId xmlns:a16="http://schemas.microsoft.com/office/drawing/2014/main" val="2848235479"/>
+                  </a:ext>
+                </a:extLst>
+              </a:tr>
+              <a:tr h="191698">
+                <a:tc>
+                  <a:txBody>
+                    <a:bodyPr/>
+                    <a:lstStyle/>
+                    <a:p>
+                      <a:pPr algn="l" fontAlgn="b"/>
+                      <a:r>
+                        <a:rPr lang="en-US" sz="1000" u="none" strike="noStrike">
+                          <a:effectLst/>
+                        </a:rPr>
+                        <a:t>Australia</a:t>
+                      </a:r>
+                      <a:endParaRPr lang="en-US" sz="1000" b="0" i="0" u="none" strike="noStrike">
+                        <a:solidFill>
+                          <a:srgbClr val="000000"/>
+                        </a:solidFill>
+                        <a:effectLst/>
+                        <a:latin typeface="Helvetica" pitchFamily="2" charset="0"/>
+                      </a:endParaRPr>
+                    </a:p>
+                  </a:txBody>
+                  <a:tcPr marL="8543" marR="8543" marT="8543" marB="0" anchor="b"/>
+                </a:tc>
+                <a:tc>
+                  <a:txBody>
+                    <a:bodyPr/>
+                    <a:lstStyle/>
+                    <a:p>
+                      <a:pPr algn="r" fontAlgn="b"/>
+                      <a:r>
+                        <a:rPr lang="en-US" sz="1000" u="none" strike="noStrike">
+                          <a:effectLst/>
+                        </a:rPr>
+                        <a:t>12</a:t>
+                      </a:r>
+                      <a:endParaRPr lang="en-US" sz="1000" b="0" i="0" u="none" strike="noStrike">
+                        <a:solidFill>
+                          <a:srgbClr val="000000"/>
+                        </a:solidFill>
+                        <a:effectLst/>
+                        <a:latin typeface="Helvetica" pitchFamily="2" charset="0"/>
+                      </a:endParaRPr>
+                    </a:p>
+                  </a:txBody>
+                  <a:tcPr marL="8543" marR="8543" marT="8543" marB="0" anchor="b"/>
+                </a:tc>
+                <a:tc>
+                  <a:txBody>
+                    <a:bodyPr/>
+                    <a:lstStyle/>
+                    <a:p>
+                      <a:pPr algn="l" fontAlgn="b"/>
+                      <a:r>
+                        <a:rPr lang="en-US" sz="1000" u="none" strike="noStrike">
+                          <a:effectLst/>
+                        </a:rPr>
+                        <a:t> $   3,663,166.67 </a:t>
+                      </a:r>
+                      <a:endParaRPr lang="en-US" sz="1000" b="0" i="0" u="none" strike="noStrike">
+                        <a:solidFill>
+                          <a:srgbClr val="000000"/>
+                        </a:solidFill>
+                        <a:effectLst/>
+                        <a:latin typeface="Helvetica" pitchFamily="2" charset="0"/>
+                      </a:endParaRPr>
+                    </a:p>
+                  </a:txBody>
+                  <a:tcPr marL="8543" marR="8543" marT="8543" marB="0" anchor="b"/>
+                </a:tc>
+                <a:tc>
+                  <a:txBody>
+                    <a:bodyPr/>
+                    <a:lstStyle/>
+                    <a:p>
+                      <a:pPr algn="r" fontAlgn="b"/>
+                      <a:r>
+                        <a:rPr lang="en-US" sz="1000" u="none" strike="noStrike">
+                          <a:effectLst/>
+                        </a:rPr>
+                        <a:t>4.46</a:t>
+                      </a:r>
+                      <a:endParaRPr lang="en-US" sz="1000" b="0" i="0" u="none" strike="noStrike">
+                        <a:solidFill>
+                          <a:srgbClr val="000000"/>
+                        </a:solidFill>
+                        <a:effectLst/>
+                        <a:latin typeface="Helvetica" pitchFamily="2" charset="0"/>
+                      </a:endParaRPr>
+                    </a:p>
+                  </a:txBody>
+                  <a:tcPr marL="8543" marR="8543" marT="8543" marB="0" anchor="b"/>
+                </a:tc>
+                <a:extLst>
+                  <a:ext uri="{0D108BD9-81ED-4DB2-BD59-A6C34878D82A}">
+                    <a16:rowId xmlns:a16="http://schemas.microsoft.com/office/drawing/2014/main" val="2407530474"/>
+                  </a:ext>
+                </a:extLst>
+              </a:tr>
+              <a:tr h="191698">
+                <a:tc>
+                  <a:txBody>
+                    <a:bodyPr/>
+                    <a:lstStyle/>
+                    <a:p>
+                      <a:pPr algn="l" fontAlgn="b"/>
+                      <a:r>
+                        <a:rPr lang="en-US" sz="1000" u="none" strike="noStrike">
+                          <a:effectLst/>
+                        </a:rPr>
+                        <a:t>Germany</a:t>
+                      </a:r>
+                      <a:endParaRPr lang="en-US" sz="1000" b="0" i="0" u="none" strike="noStrike">
+                        <a:solidFill>
+                          <a:srgbClr val="000000"/>
+                        </a:solidFill>
+                        <a:effectLst/>
+                        <a:latin typeface="Helvetica" pitchFamily="2" charset="0"/>
+                      </a:endParaRPr>
+                    </a:p>
+                  </a:txBody>
+                  <a:tcPr marL="8543" marR="8543" marT="8543" marB="0" anchor="b"/>
+                </a:tc>
+                <a:tc>
+                  <a:txBody>
+                    <a:bodyPr/>
+                    <a:lstStyle/>
+                    <a:p>
+                      <a:pPr algn="r" fontAlgn="b"/>
+                      <a:r>
+                        <a:rPr lang="en-US" sz="1000" u="none" strike="noStrike">
+                          <a:effectLst/>
+                        </a:rPr>
+                        <a:t>21</a:t>
+                      </a:r>
+                      <a:endParaRPr lang="en-US" sz="1000" b="0" i="0" u="none" strike="noStrike">
+                        <a:solidFill>
+                          <a:srgbClr val="000000"/>
+                        </a:solidFill>
+                        <a:effectLst/>
+                        <a:latin typeface="Helvetica" pitchFamily="2" charset="0"/>
+                      </a:endParaRPr>
+                    </a:p>
+                  </a:txBody>
+                  <a:tcPr marL="8543" marR="8543" marT="8543" marB="0" anchor="b"/>
+                </a:tc>
+                <a:tc>
+                  <a:txBody>
+                    <a:bodyPr/>
+                    <a:lstStyle/>
+                    <a:p>
+                      <a:pPr algn="l" fontAlgn="b"/>
+                      <a:r>
+                        <a:rPr lang="en-US" sz="1000" u="none" strike="noStrike">
+                          <a:effectLst/>
+                        </a:rPr>
+                        <a:t> $      927,872.10 </a:t>
+                      </a:r>
+                      <a:endParaRPr lang="en-US" sz="1000" b="0" i="0" u="none" strike="noStrike">
+                        <a:solidFill>
+                          <a:srgbClr val="000000"/>
+                        </a:solidFill>
+                        <a:effectLst/>
+                        <a:latin typeface="Helvetica" pitchFamily="2" charset="0"/>
+                      </a:endParaRPr>
+                    </a:p>
+                  </a:txBody>
+                  <a:tcPr marL="8543" marR="8543" marT="8543" marB="0" anchor="b"/>
+                </a:tc>
+                <a:tc>
+                  <a:txBody>
+                    <a:bodyPr/>
+                    <a:lstStyle/>
+                    <a:p>
+                      <a:pPr algn="r" fontAlgn="b"/>
+                      <a:r>
+                        <a:rPr lang="en-US" sz="1000" u="none" strike="noStrike">
+                          <a:effectLst/>
+                        </a:rPr>
+                        <a:t>4.37</a:t>
+                      </a:r>
+                      <a:endParaRPr lang="en-US" sz="1000" b="0" i="0" u="none" strike="noStrike">
+                        <a:solidFill>
+                          <a:srgbClr val="000000"/>
+                        </a:solidFill>
+                        <a:effectLst/>
+                        <a:latin typeface="Helvetica" pitchFamily="2" charset="0"/>
+                      </a:endParaRPr>
+                    </a:p>
+                  </a:txBody>
+                  <a:tcPr marL="8543" marR="8543" marT="8543" marB="0" anchor="b"/>
+                </a:tc>
+                <a:extLst>
+                  <a:ext uri="{0D108BD9-81ED-4DB2-BD59-A6C34878D82A}">
+                    <a16:rowId xmlns:a16="http://schemas.microsoft.com/office/drawing/2014/main" val="1423678918"/>
+                  </a:ext>
+                </a:extLst>
+              </a:tr>
+              <a:tr h="191698">
+                <a:tc>
+                  <a:txBody>
+                    <a:bodyPr/>
+                    <a:lstStyle/>
+                    <a:p>
+                      <a:pPr algn="l" fontAlgn="b"/>
+                      <a:r>
+                        <a:rPr lang="en-US" sz="1000" u="none" strike="noStrike">
+                          <a:effectLst/>
+                        </a:rPr>
+                        <a:t>Japan</a:t>
+                      </a:r>
+                      <a:endParaRPr lang="en-US" sz="1000" b="0" i="0" u="none" strike="noStrike">
+                        <a:solidFill>
+                          <a:srgbClr val="000000"/>
+                        </a:solidFill>
+                        <a:effectLst/>
+                        <a:latin typeface="Helvetica" pitchFamily="2" charset="0"/>
+                      </a:endParaRPr>
+                    </a:p>
+                  </a:txBody>
+                  <a:tcPr marL="8543" marR="8543" marT="8543" marB="0" anchor="b"/>
+                </a:tc>
+                <a:tc>
+                  <a:txBody>
+                    <a:bodyPr/>
+                    <a:lstStyle/>
+                    <a:p>
+                      <a:pPr algn="r" fontAlgn="b"/>
+                      <a:r>
+                        <a:rPr lang="en-US" sz="1000" u="none" strike="noStrike">
+                          <a:effectLst/>
+                        </a:rPr>
+                        <a:t>11</a:t>
+                      </a:r>
+                      <a:endParaRPr lang="en-US" sz="1000" b="0" i="0" u="none" strike="noStrike">
+                        <a:solidFill>
+                          <a:srgbClr val="000000"/>
+                        </a:solidFill>
+                        <a:effectLst/>
+                        <a:latin typeface="Helvetica" pitchFamily="2" charset="0"/>
+                      </a:endParaRPr>
+                    </a:p>
+                  </a:txBody>
+                  <a:tcPr marL="8543" marR="8543" marT="8543" marB="0" anchor="b"/>
+                </a:tc>
+                <a:tc>
+                  <a:txBody>
+                    <a:bodyPr/>
+                    <a:lstStyle/>
+                    <a:p>
+                      <a:pPr algn="l" fontAlgn="b"/>
+                      <a:r>
+                        <a:rPr lang="en-US" sz="1000" u="none" strike="noStrike">
+                          <a:effectLst/>
+                        </a:rPr>
+                        <a:t> $   3,385,727.27 </a:t>
+                      </a:r>
+                      <a:endParaRPr lang="en-US" sz="1000" b="0" i="0" u="none" strike="noStrike">
+                        <a:solidFill>
+                          <a:srgbClr val="000000"/>
+                        </a:solidFill>
+                        <a:effectLst/>
+                        <a:latin typeface="Helvetica" pitchFamily="2" charset="0"/>
+                      </a:endParaRPr>
+                    </a:p>
+                  </a:txBody>
+                  <a:tcPr marL="8543" marR="8543" marT="8543" marB="0" anchor="b"/>
+                </a:tc>
+                <a:tc>
+                  <a:txBody>
+                    <a:bodyPr/>
+                    <a:lstStyle/>
+                    <a:p>
+                      <a:pPr algn="r" fontAlgn="b"/>
+                      <a:r>
+                        <a:rPr lang="en-US" sz="1000" u="none" strike="noStrike">
+                          <a:effectLst/>
+                        </a:rPr>
+                        <a:t>4.12</a:t>
+                      </a:r>
+                      <a:endParaRPr lang="en-US" sz="1000" b="0" i="0" u="none" strike="noStrike">
+                        <a:solidFill>
+                          <a:srgbClr val="000000"/>
+                        </a:solidFill>
+                        <a:effectLst/>
+                        <a:latin typeface="Helvetica" pitchFamily="2" charset="0"/>
+                      </a:endParaRPr>
+                    </a:p>
+                  </a:txBody>
+                  <a:tcPr marL="8543" marR="8543" marT="8543" marB="0" anchor="b"/>
+                </a:tc>
+                <a:extLst>
+                  <a:ext uri="{0D108BD9-81ED-4DB2-BD59-A6C34878D82A}">
+                    <a16:rowId xmlns:a16="http://schemas.microsoft.com/office/drawing/2014/main" val="1371962878"/>
+                  </a:ext>
+                </a:extLst>
+              </a:tr>
+              <a:tr h="191698">
+                <a:tc>
+                  <a:txBody>
+                    <a:bodyPr/>
+                    <a:lstStyle/>
+                    <a:p>
+                      <a:pPr algn="l" fontAlgn="b"/>
+                      <a:r>
+                        <a:rPr lang="en-US" sz="1000" u="none" strike="noStrike">
+                          <a:effectLst/>
+                        </a:rPr>
+                        <a:t>Peru</a:t>
+                      </a:r>
+                      <a:endParaRPr lang="en-US" sz="1000" b="0" i="0" u="none" strike="noStrike">
+                        <a:solidFill>
+                          <a:srgbClr val="000000"/>
+                        </a:solidFill>
+                        <a:effectLst/>
+                        <a:latin typeface="Helvetica" pitchFamily="2" charset="0"/>
+                      </a:endParaRPr>
+                    </a:p>
+                  </a:txBody>
+                  <a:tcPr marL="8543" marR="8543" marT="8543" marB="0" anchor="b"/>
+                </a:tc>
+                <a:tc>
+                  <a:txBody>
+                    <a:bodyPr/>
+                    <a:lstStyle/>
+                    <a:p>
+                      <a:pPr algn="r" fontAlgn="b"/>
+                      <a:r>
+                        <a:rPr lang="en-US" sz="1000" u="none" strike="noStrike">
+                          <a:effectLst/>
+                        </a:rPr>
+                        <a:t>10</a:t>
+                      </a:r>
+                      <a:endParaRPr lang="en-US" sz="1000" b="0" i="0" u="none" strike="noStrike">
+                        <a:solidFill>
+                          <a:srgbClr val="000000"/>
+                        </a:solidFill>
+                        <a:effectLst/>
+                        <a:latin typeface="Helvetica" pitchFamily="2" charset="0"/>
+                      </a:endParaRPr>
+                    </a:p>
+                  </a:txBody>
+                  <a:tcPr marL="8543" marR="8543" marT="8543" marB="0" anchor="b"/>
+                </a:tc>
+                <a:tc>
+                  <a:txBody>
+                    <a:bodyPr/>
+                    <a:lstStyle/>
+                    <a:p>
+                      <a:pPr algn="l" fontAlgn="b"/>
+                      <a:r>
+                        <a:rPr lang="en-US" sz="1000" u="none" strike="noStrike">
+                          <a:effectLst/>
+                        </a:rPr>
+                        <a:t> $   1,110,100.00 </a:t>
+                      </a:r>
+                      <a:endParaRPr lang="en-US" sz="1000" b="0" i="0" u="none" strike="noStrike">
+                        <a:solidFill>
+                          <a:srgbClr val="000000"/>
+                        </a:solidFill>
+                        <a:effectLst/>
+                        <a:latin typeface="Helvetica" pitchFamily="2" charset="0"/>
+                      </a:endParaRPr>
+                    </a:p>
+                  </a:txBody>
+                  <a:tcPr marL="8543" marR="8543" marT="8543" marB="0" anchor="b"/>
+                </a:tc>
+                <a:tc>
+                  <a:txBody>
+                    <a:bodyPr/>
+                    <a:lstStyle/>
+                    <a:p>
+                      <a:pPr algn="r" fontAlgn="b"/>
+                      <a:r>
+                        <a:rPr lang="en-US" sz="1000" u="none" strike="noStrike">
+                          <a:effectLst/>
+                        </a:rPr>
+                        <a:t>3.72</a:t>
+                      </a:r>
+                      <a:endParaRPr lang="en-US" sz="1000" b="0" i="0" u="none" strike="noStrike">
+                        <a:solidFill>
+                          <a:srgbClr val="000000"/>
+                        </a:solidFill>
+                        <a:effectLst/>
+                        <a:latin typeface="Helvetica" pitchFamily="2" charset="0"/>
+                      </a:endParaRPr>
+                    </a:p>
+                  </a:txBody>
+                  <a:tcPr marL="8543" marR="8543" marT="8543" marB="0" anchor="b"/>
+                </a:tc>
+                <a:extLst>
+                  <a:ext uri="{0D108BD9-81ED-4DB2-BD59-A6C34878D82A}">
+                    <a16:rowId xmlns:a16="http://schemas.microsoft.com/office/drawing/2014/main" val="1468540937"/>
+                  </a:ext>
+                </a:extLst>
+              </a:tr>
+              <a:tr h="191698">
+                <a:tc>
+                  <a:txBody>
+                    <a:bodyPr/>
+                    <a:lstStyle/>
+                    <a:p>
+                      <a:pPr algn="l" fontAlgn="b"/>
+                      <a:endParaRPr lang="en-US" sz="1000" b="0" i="0" u="none" strike="noStrike">
+                        <a:solidFill>
+                          <a:srgbClr val="000000"/>
+                        </a:solidFill>
+                        <a:effectLst/>
+                        <a:latin typeface="Helvetica" pitchFamily="2" charset="0"/>
+                      </a:endParaRPr>
+                    </a:p>
+                  </a:txBody>
+                  <a:tcPr marL="8543" marR="8543" marT="8543" marB="0" anchor="b"/>
+                </a:tc>
+                <a:tc>
+                  <a:txBody>
+                    <a:bodyPr/>
+                    <a:lstStyle/>
+                    <a:p>
+                      <a:pPr algn="r" fontAlgn="b"/>
+                      <a:r>
+                        <a:rPr lang="en-US" sz="1000" u="none" strike="noStrike">
+                          <a:effectLst/>
+                        </a:rPr>
+                        <a:t>1030</a:t>
+                      </a:r>
+                      <a:endParaRPr lang="en-US" sz="1000" b="0" i="0" u="none" strike="noStrike">
+                        <a:solidFill>
+                          <a:srgbClr val="000000"/>
+                        </a:solidFill>
+                        <a:effectLst/>
+                        <a:latin typeface="Helvetica" pitchFamily="2" charset="0"/>
+                      </a:endParaRPr>
+                    </a:p>
+                  </a:txBody>
+                  <a:tcPr marL="8543" marR="8543" marT="8543" marB="0" anchor="b"/>
+                </a:tc>
+                <a:tc>
+                  <a:txBody>
+                    <a:bodyPr/>
+                    <a:lstStyle/>
+                    <a:p>
+                      <a:pPr algn="l" fontAlgn="b"/>
+                      <a:r>
+                        <a:rPr lang="en-US" sz="1000" u="none" strike="noStrike">
+                          <a:effectLst/>
+                        </a:rPr>
+                        <a:t> $   9,163,941.39 </a:t>
+                      </a:r>
+                      <a:endParaRPr lang="en-US" sz="1000" b="0" i="0" u="none" strike="noStrike">
+                        <a:solidFill>
+                          <a:srgbClr val="000000"/>
+                        </a:solidFill>
+                        <a:effectLst/>
+                        <a:latin typeface="Helvetica" pitchFamily="2" charset="0"/>
+                      </a:endParaRPr>
+                    </a:p>
+                  </a:txBody>
+                  <a:tcPr marL="8543" marR="8543" marT="8543" marB="0" anchor="b"/>
+                </a:tc>
+                <a:tc>
+                  <a:txBody>
+                    <a:bodyPr/>
+                    <a:lstStyle/>
+                    <a:p>
+                      <a:pPr algn="r" fontAlgn="b"/>
+                      <a:r>
+                        <a:rPr lang="en-US" sz="1000" u="none" strike="noStrike">
+                          <a:effectLst/>
+                        </a:rPr>
+                        <a:t>4.89</a:t>
+                      </a:r>
+                      <a:endParaRPr lang="en-US" sz="1000" b="0" i="0" u="none" strike="noStrike">
+                        <a:solidFill>
+                          <a:srgbClr val="000000"/>
+                        </a:solidFill>
+                        <a:effectLst/>
+                        <a:latin typeface="Helvetica" pitchFamily="2" charset="0"/>
+                      </a:endParaRPr>
+                    </a:p>
+                  </a:txBody>
+                  <a:tcPr marL="8543" marR="8543" marT="8543" marB="0" anchor="b"/>
+                </a:tc>
+                <a:extLst>
+                  <a:ext uri="{0D108BD9-81ED-4DB2-BD59-A6C34878D82A}">
+                    <a16:rowId xmlns:a16="http://schemas.microsoft.com/office/drawing/2014/main" val="1082366865"/>
+                  </a:ext>
+                </a:extLst>
+              </a:tr>
+            </a:tbl>
+          </a:graphicData>
+        </a:graphic>
+      </p:graphicFrame>
     </p:spTree>
     <p:extLst>
       <p:ext uri="{BB962C8B-B14F-4D97-AF65-F5344CB8AC3E}">
-        <p14:creationId xmlns:p14="http://schemas.microsoft.com/office/powerpoint/2010/main" val="1068830328"/>
+        <p14:creationId xmlns:p14="http://schemas.microsoft.com/office/powerpoint/2010/main" val="2295519023"/>
       </p:ext>
     </p:extLst>
   </p:cSld>
@@ -16597,7 +18211,7 @@
                 <a:latin typeface="Simplified Arabic Fixed" panose="02070309020205020404" pitchFamily="49" charset="-78"/>
                 <a:cs typeface="Simplified Arabic Fixed" panose="02070309020205020404" pitchFamily="49" charset="-78"/>
               </a:rPr>
-              <a:t>Country Analysis: Question 2</a:t>
+              <a:t>Country Analysis: Question 1</a:t>
             </a:r>
           </a:p>
         </p:txBody>
@@ -16621,7 +18235,7 @@
         <p:spPr>
           <a:xfrm>
             <a:off x="1154955" y="2603500"/>
-            <a:ext cx="4082968" cy="3416300"/>
+            <a:ext cx="3481054" cy="3416300"/>
           </a:xfrm>
         </p:spPr>
         <p:txBody>
@@ -16632,31 +18246,233 @@
           <a:p>
             <a:r>
               <a:rPr lang="en-US" sz="1600" dirty="0"/>
-              <a:t>What is the relationship between rating average and country?</a:t>
+              <a:t>What country spends the most on average per movie?</a:t>
             </a:r>
           </a:p>
           <a:p>
             <a:pPr lvl="1"/>
             <a:r>
-              <a:rPr lang="en-US" sz="1400" dirty="0"/>
-              <a:t>Looking at the ratings and the budget, Horror movies seem to be a popular genre</a:t>
+              <a:rPr lang="en-US" dirty="0"/>
+              <a:t>India spent $60 million more than then the 2</a:t>
+            </a:r>
+            <a:r>
+              <a:rPr lang="en-US" baseline="30000" dirty="0"/>
+              <a:t>nd</a:t>
+            </a:r>
+            <a:r>
+              <a:rPr lang="en-US" dirty="0"/>
+              <a:t> most spending country</a:t>
             </a:r>
           </a:p>
           <a:p>
             <a:pPr lvl="1"/>
             <a:r>
-              <a:rPr lang="en-US" sz="1400" dirty="0"/>
-              <a:t>Japan only made 11 movies, the average rating was the highest amount the countries</a:t>
+              <a:rPr lang="en-US" dirty="0"/>
+              <a:t>On average the other countries spend roughly $4 million per movie</a:t>
             </a:r>
+          </a:p>
+          <a:p>
+            <a:pPr lvl="1"/>
+            <a:endParaRPr lang="en-US" dirty="0"/>
           </a:p>
         </p:txBody>
       </p:sp>
       <p:pic>
         <p:nvPicPr>
-          <p:cNvPr id="4" name="Picture 3">
+          <p:cNvPr id="8" name="Picture 7">
             <a:extLst>
               <a:ext uri="{FF2B5EF4-FFF2-40B4-BE49-F238E27FC236}">
-                <a16:creationId xmlns:a16="http://schemas.microsoft.com/office/drawing/2014/main" id="{B0AAA095-2A25-3EA3-0C8E-009BB15BCA88}"/>
+                <a16:creationId xmlns:a16="http://schemas.microsoft.com/office/drawing/2014/main" id="{BF570C56-B19D-9D88-DCE0-FD8C859CCE74}"/>
+              </a:ext>
+            </a:extLst>
+          </p:cNvPr>
+          <p:cNvPicPr>
+            <a:picLocks noChangeAspect="1"/>
+          </p:cNvPicPr>
+          <p:nvPr/>
+        </p:nvPicPr>
+        <p:blipFill rotWithShape="1">
+          <a:blip r:embed="rId2"/>
+          <a:srcRect r="-3387" b="-3387"/>
+          <a:stretch/>
+        </p:blipFill>
+        <p:spPr>
+          <a:xfrm>
+            <a:off x="4841778" y="2603500"/>
+            <a:ext cx="2980034" cy="3546288"/>
+          </a:xfrm>
+          <a:prstGeom prst="roundRect">
+            <a:avLst>
+              <a:gd name="adj" fmla="val 1858"/>
+            </a:avLst>
+          </a:prstGeom>
+          <a:effectLst/>
+        </p:spPr>
+      </p:pic>
+      <p:pic>
+        <p:nvPicPr>
+          <p:cNvPr id="7" name="Picture 6">
+            <a:extLst>
+              <a:ext uri="{FF2B5EF4-FFF2-40B4-BE49-F238E27FC236}">
+                <a16:creationId xmlns:a16="http://schemas.microsoft.com/office/drawing/2014/main" id="{EA7FAAD5-086B-1C58-689A-044424D67D7A}"/>
+              </a:ext>
+            </a:extLst>
+          </p:cNvPr>
+          <p:cNvPicPr>
+            <a:picLocks noChangeAspect="1"/>
+          </p:cNvPicPr>
+          <p:nvPr/>
+        </p:nvPicPr>
+        <p:blipFill>
+          <a:blip r:embed="rId3"/>
+          <a:stretch>
+            <a:fillRect/>
+          </a:stretch>
+        </p:blipFill>
+        <p:spPr>
+          <a:xfrm>
+            <a:off x="7821813" y="2603500"/>
+            <a:ext cx="4137106" cy="3306580"/>
+          </a:xfrm>
+          <a:prstGeom prst="roundRect">
+            <a:avLst>
+              <a:gd name="adj" fmla="val 1858"/>
+            </a:avLst>
+          </a:prstGeom>
+          <a:effectLst/>
+        </p:spPr>
+      </p:pic>
+    </p:spTree>
+    <p:extLst>
+      <p:ext uri="{BB962C8B-B14F-4D97-AF65-F5344CB8AC3E}">
+        <p14:creationId xmlns:p14="http://schemas.microsoft.com/office/powerpoint/2010/main" val="1068830328"/>
+      </p:ext>
+    </p:extLst>
+  </p:cSld>
+  <p:clrMapOvr>
+    <a:masterClrMapping/>
+  </p:clrMapOvr>
+</p:sld>
+</file>
+
+<file path=ppt/slides/slide8.xml><?xml version="1.0" encoding="utf-8"?>
+<p:sld xmlns:a="http://schemas.openxmlformats.org/drawingml/2006/main" xmlns:r="http://schemas.openxmlformats.org/officeDocument/2006/relationships" xmlns:p="http://schemas.openxmlformats.org/presentationml/2006/main">
+  <p:cSld>
+    <p:bg>
+      <p:bgPr>
+        <a:solidFill>
+          <a:schemeClr val="bg1"/>
+        </a:solidFill>
+        <a:effectLst/>
+      </p:bgPr>
+    </p:bg>
+    <p:spTree>
+      <p:nvGrpSpPr>
+        <p:cNvPr id="1" name=""/>
+        <p:cNvGrpSpPr/>
+        <p:nvPr/>
+      </p:nvGrpSpPr>
+      <p:grpSpPr>
+        <a:xfrm>
+          <a:off x="0" y="0"/>
+          <a:ext cx="0" cy="0"/>
+          <a:chOff x="0" y="0"/>
+          <a:chExt cx="0" cy="0"/>
+        </a:xfrm>
+      </p:grpSpPr>
+      <p:sp>
+        <p:nvSpPr>
+          <p:cNvPr id="2" name="Title 1">
+            <a:extLst>
+              <a:ext uri="{FF2B5EF4-FFF2-40B4-BE49-F238E27FC236}">
+                <a16:creationId xmlns:a16="http://schemas.microsoft.com/office/drawing/2014/main" id="{62996E13-90E2-C085-109D-9CB4B9409557}"/>
+              </a:ext>
+            </a:extLst>
+          </p:cNvPr>
+          <p:cNvSpPr>
+            <a:spLocks noGrp="1"/>
+          </p:cNvSpPr>
+          <p:nvPr>
+            <p:ph type="title"/>
+          </p:nvPr>
+        </p:nvSpPr>
+        <p:spPr>
+          <a:xfrm>
+            <a:off x="1154954" y="947920"/>
+            <a:ext cx="8761413" cy="728480"/>
+          </a:xfrm>
+        </p:spPr>
+        <p:txBody>
+          <a:bodyPr>
+            <a:normAutofit/>
+          </a:bodyPr>
+          <a:lstStyle/>
+          <a:p>
+            <a:r>
+              <a:rPr lang="en-US" dirty="0">
+                <a:latin typeface="Simplified Arabic Fixed" panose="02070309020205020404" pitchFamily="49" charset="-78"/>
+                <a:cs typeface="Simplified Arabic Fixed" panose="02070309020205020404" pitchFamily="49" charset="-78"/>
+              </a:rPr>
+              <a:t>Country Analysis: Question 2</a:t>
+            </a:r>
+          </a:p>
+        </p:txBody>
+      </p:sp>
+      <p:sp>
+        <p:nvSpPr>
+          <p:cNvPr id="3" name="Content Placeholder 2">
+            <a:extLst>
+              <a:ext uri="{FF2B5EF4-FFF2-40B4-BE49-F238E27FC236}">
+                <a16:creationId xmlns:a16="http://schemas.microsoft.com/office/drawing/2014/main" id="{57505223-4AEB-2246-ACA4-BBD7BED52E1B}"/>
+              </a:ext>
+            </a:extLst>
+          </p:cNvPr>
+          <p:cNvSpPr>
+            <a:spLocks noGrp="1"/>
+          </p:cNvSpPr>
+          <p:nvPr>
+            <p:ph idx="1"/>
+          </p:nvPr>
+        </p:nvSpPr>
+        <p:spPr>
+          <a:xfrm>
+            <a:off x="1154954" y="2603500"/>
+            <a:ext cx="5211979" cy="3416300"/>
+          </a:xfrm>
+        </p:spPr>
+        <p:txBody>
+          <a:bodyPr anchor="ctr">
+            <a:normAutofit/>
+          </a:bodyPr>
+          <a:lstStyle/>
+          <a:p>
+            <a:r>
+              <a:rPr lang="en-US" dirty="0"/>
+              <a:t>What is the relationship between rating average and country?</a:t>
+            </a:r>
+          </a:p>
+          <a:p>
+            <a:pPr lvl="1"/>
+            <a:r>
+              <a:rPr lang="en-US" dirty="0"/>
+              <a:t>UK produced the second most movies, but the ratings were virtually identical to Canada</a:t>
+            </a:r>
+          </a:p>
+          <a:p>
+            <a:pPr lvl="1"/>
+            <a:r>
+              <a:rPr lang="en-US" dirty="0"/>
+              <a:t>India spent the most on average per movie and had the highest ratings</a:t>
+            </a:r>
+          </a:p>
+        </p:txBody>
+      </p:sp>
+      <p:pic>
+        <p:nvPicPr>
+          <p:cNvPr id="6" name="Picture 5">
+            <a:extLst>
+              <a:ext uri="{FF2B5EF4-FFF2-40B4-BE49-F238E27FC236}">
+                <a16:creationId xmlns:a16="http://schemas.microsoft.com/office/drawing/2014/main" id="{6C337279-D5B0-8F01-9B55-CA48D46CDA47}"/>
               </a:ext>
             </a:extLst>
           </p:cNvPr>
@@ -16673,12 +18489,21 @@
         </p:blipFill>
         <p:spPr>
           <a:xfrm>
-            <a:off x="5536096" y="2435087"/>
-            <a:ext cx="6655904" cy="4084983"/>
+            <a:off x="7213402" y="2806899"/>
+            <a:ext cx="4345024" cy="3009501"/>
           </a:xfrm>
-          <a:prstGeom prst="rect">
-            <a:avLst/>
+          <a:prstGeom prst="roundRect">
+            <a:avLst>
+              <a:gd name="adj" fmla="val 1858"/>
+            </a:avLst>
           </a:prstGeom>
+          <a:effectLst>
+            <a:outerShdw blurRad="50800" dist="50800" dir="5400000" algn="tl" rotWithShape="0">
+              <a:srgbClr val="000000">
+                <a:alpha val="43000"/>
+              </a:srgbClr>
+            </a:outerShdw>
+          </a:effectLst>
         </p:spPr>
       </p:pic>
     </p:spTree>
@@ -16786,9 +18611,17 @@
 </p:sld>
 </file>
 
-<file path=ppt/slides/slide8.xml><?xml version="1.0" encoding="utf-8"?>
+<file path=ppt/slides/slide9.xml><?xml version="1.0" encoding="utf-8"?>
 <p:sld xmlns:a="http://schemas.openxmlformats.org/drawingml/2006/main" xmlns:r="http://schemas.openxmlformats.org/officeDocument/2006/relationships" xmlns:p="http://schemas.openxmlformats.org/presentationml/2006/main">
   <p:cSld>
+    <p:bg>
+      <p:bgPr>
+        <a:solidFill>
+          <a:schemeClr val="bg1"/>
+        </a:solidFill>
+        <a:effectLst/>
+      </p:bgPr>
+    </p:bg>
     <p:spTree>
       <p:nvGrpSpPr>
         <p:cNvPr id="1" name=""/>
@@ -16808,7 +18641,7 @@
           <p:cNvPr id="2" name="Title 1">
             <a:extLst>
               <a:ext uri="{FF2B5EF4-FFF2-40B4-BE49-F238E27FC236}">
-                <a16:creationId xmlns:a16="http://schemas.microsoft.com/office/drawing/2014/main" id="{303A4144-7281-3A71-046F-A706B6954FD3}"/>
+                <a16:creationId xmlns:a16="http://schemas.microsoft.com/office/drawing/2014/main" id="{BF889BD1-941D-0C01-842E-0C64DB41DEED}"/>
               </a:ext>
             </a:extLst>
           </p:cNvPr>
@@ -16819,14 +18652,21 @@
             <p:ph type="title"/>
           </p:nvPr>
         </p:nvSpPr>
-        <p:spPr/>
+        <p:spPr>
+          <a:xfrm>
+            <a:off x="1154954" y="947920"/>
+            <a:ext cx="8761413" cy="728480"/>
+          </a:xfrm>
+        </p:spPr>
         <p:txBody>
-          <a:bodyPr/>
+          <a:bodyPr>
+            <a:normAutofit/>
+          </a:bodyPr>
           <a:lstStyle/>
           <a:p>
             <a:r>
               <a:rPr lang="en-US" dirty="0"/>
-              <a:t>Country Analysis Facts 2012-2017</a:t>
+              <a:t>Country Analysis Movie Count</a:t>
             </a:r>
           </a:p>
         </p:txBody>
@@ -16836,7 +18676,7 @@
           <p:cNvPr id="3" name="Content Placeholder 2">
             <a:extLst>
               <a:ext uri="{FF2B5EF4-FFF2-40B4-BE49-F238E27FC236}">
-                <a16:creationId xmlns:a16="http://schemas.microsoft.com/office/drawing/2014/main" id="{772DE080-3718-DDFA-30F7-7F4D0087CE7B}"/>
+                <a16:creationId xmlns:a16="http://schemas.microsoft.com/office/drawing/2014/main" id="{06C14A52-AA0A-DC23-E428-5E4E8ECFCE2D}"/>
               </a:ext>
             </a:extLst>
           </p:cNvPr>
@@ -16850,1252 +18690,76 @@
         <p:spPr>
           <a:xfrm>
             <a:off x="1154954" y="2603500"/>
-            <a:ext cx="5593716" cy="3707848"/>
+            <a:ext cx="5211979" cy="3416300"/>
           </a:xfrm>
         </p:spPr>
         <p:txBody>
-          <a:bodyPr/>
+          <a:bodyPr anchor="ctr">
+            <a:normAutofit/>
+          </a:bodyPr>
           <a:lstStyle/>
           <a:p>
             <a:r>
               <a:rPr lang="en-US" dirty="0"/>
-              <a:t>Country Movie Count vs. Budget</a:t>
+              <a:t>United States produced more than 800 movies found in the data set.  Only 769 were included in the analysis</a:t>
             </a:r>
           </a:p>
           <a:p>
-            <a:pPr lvl="1"/>
             <a:r>
               <a:rPr lang="en-US" dirty="0"/>
-              <a:t>14 countries out 70+ were included in the analysis</a:t>
+              <a:t>A large majority of the countries not included in this analysis produced &gt;= 5 movies</a:t>
             </a:r>
           </a:p>
           <a:p>
-            <a:pPr lvl="1"/>
             <a:r>
               <a:rPr lang="en-US" dirty="0"/>
-              <a:t>There were large majority of countries with less than 10 movies</a:t>
+              <a:t>Peru produced 10 movies and had the lowest average rating</a:t>
             </a:r>
-          </a:p>
-          <a:p>
-            <a:pPr lvl="1"/>
-            <a:r>
-              <a:rPr lang="en-US" dirty="0"/>
-              <a:t>India’s average budget is roughly $67 million more per movie than the United States</a:t>
-            </a:r>
-          </a:p>
-          <a:p>
-            <a:pPr lvl="1"/>
-            <a:r>
-              <a:rPr lang="en-US" dirty="0"/>
-              <a:t>UK made the second most movies with a more moderate budget per movie</a:t>
-            </a:r>
-          </a:p>
-          <a:p>
-            <a:endParaRPr lang="en-US" dirty="0"/>
           </a:p>
         </p:txBody>
       </p:sp>
-      <p:graphicFrame>
-        <p:nvGraphicFramePr>
-          <p:cNvPr id="6" name="Table 5">
+      <p:pic>
+        <p:nvPicPr>
+          <p:cNvPr id="5" name="Picture 4">
             <a:extLst>
               <a:ext uri="{FF2B5EF4-FFF2-40B4-BE49-F238E27FC236}">
-                <a16:creationId xmlns:a16="http://schemas.microsoft.com/office/drawing/2014/main" id="{05B9DB41-AEB2-2150-8E28-F216E313D5F1}"/>
+                <a16:creationId xmlns:a16="http://schemas.microsoft.com/office/drawing/2014/main" id="{6AD2C1C2-F7E1-AAB9-0D2D-5AE288897CA9}"/>
               </a:ext>
             </a:extLst>
           </p:cNvPr>
-          <p:cNvGraphicFramePr>
-            <a:graphicFrameLocks noGrp="1"/>
-          </p:cNvGraphicFramePr>
-          <p:nvPr>
-            <p:extLst>
-              <p:ext uri="{D42A27DB-BD31-4B8C-83A1-F6EECF244321}">
-                <p14:modId xmlns:p14="http://schemas.microsoft.com/office/powerpoint/2010/main" val="1836910575"/>
-              </p:ext>
-            </p:extLst>
-          </p:nvPr>
-        </p:nvGraphicFramePr>
-        <p:xfrm>
-          <a:off x="6843367" y="2933424"/>
-          <a:ext cx="3594100" cy="3048000"/>
-        </p:xfrm>
-        <a:graphic>
-          <a:graphicData uri="http://schemas.openxmlformats.org/drawingml/2006/table">
-            <a:tbl>
-              <a:tblPr>
-                <a:tableStyleId>{5C22544A-7EE6-4342-B048-85BDC9FD1C3A}</a:tableStyleId>
-              </a:tblPr>
-              <a:tblGrid>
-                <a:gridCol w="1321640">
-                  <a:extLst>
-                    <a:ext uri="{9D8B030D-6E8A-4147-A177-3AD203B41FA5}">
-                      <a16:colId xmlns:a16="http://schemas.microsoft.com/office/drawing/2014/main" val="3020473959"/>
-                    </a:ext>
-                  </a:extLst>
-                </a:gridCol>
-                <a:gridCol w="988853">
-                  <a:extLst>
-                    <a:ext uri="{9D8B030D-6E8A-4147-A177-3AD203B41FA5}">
-                      <a16:colId xmlns:a16="http://schemas.microsoft.com/office/drawing/2014/main" val="3550650410"/>
-                    </a:ext>
-                  </a:extLst>
-                </a:gridCol>
-                <a:gridCol w="1283607">
-                  <a:extLst>
-                    <a:ext uri="{9D8B030D-6E8A-4147-A177-3AD203B41FA5}">
-                      <a16:colId xmlns:a16="http://schemas.microsoft.com/office/drawing/2014/main" val="1586906145"/>
-                    </a:ext>
-                  </a:extLst>
-                </a:gridCol>
-              </a:tblGrid>
-              <a:tr h="203200">
-                <a:tc>
-                  <a:txBody>
-                    <a:bodyPr/>
-                    <a:lstStyle/>
-                    <a:p>
-                      <a:pPr algn="l" fontAlgn="b"/>
-                      <a:r>
-                        <a:rPr lang="en-US" sz="1200" u="none" strike="noStrike">
-                          <a:effectLst/>
-                        </a:rPr>
-                        <a:t>Release Country</a:t>
-                      </a:r>
-                      <a:endParaRPr lang="en-US" sz="1200" b="1" i="0" u="none" strike="noStrike">
-                        <a:solidFill>
-                          <a:srgbClr val="000000"/>
-                        </a:solidFill>
-                        <a:effectLst/>
-                        <a:latin typeface="Helvetica" pitchFamily="2" charset="0"/>
-                      </a:endParaRPr>
-                    </a:p>
-                  </a:txBody>
-                  <a:tcPr marL="9525" marR="9525" marT="9525" marB="0" anchor="b"/>
-                </a:tc>
-                <a:tc>
-                  <a:txBody>
-                    <a:bodyPr/>
-                    <a:lstStyle/>
-                    <a:p>
-                      <a:pPr algn="l" fontAlgn="b"/>
-                      <a:r>
-                        <a:rPr lang="en-US" sz="1200" u="none" strike="noStrike">
-                          <a:effectLst/>
-                        </a:rPr>
-                        <a:t>Movie Count</a:t>
-                      </a:r>
-                      <a:endParaRPr lang="en-US" sz="1200" b="1" i="0" u="none" strike="noStrike">
-                        <a:solidFill>
-                          <a:srgbClr val="000000"/>
-                        </a:solidFill>
-                        <a:effectLst/>
-                        <a:latin typeface="Helvetica" pitchFamily="2" charset="0"/>
-                      </a:endParaRPr>
-                    </a:p>
-                  </a:txBody>
-                  <a:tcPr marL="9525" marR="9525" marT="9525" marB="0" anchor="b"/>
-                </a:tc>
-                <a:tc>
-                  <a:txBody>
-                    <a:bodyPr/>
-                    <a:lstStyle/>
-                    <a:p>
-                      <a:pPr algn="l" fontAlgn="b"/>
-                      <a:r>
-                        <a:rPr lang="en-US" sz="1200" u="none" strike="noStrike">
-                          <a:effectLst/>
-                        </a:rPr>
-                        <a:t>Average Budget</a:t>
-                      </a:r>
-                      <a:endParaRPr lang="en-US" sz="1200" b="1" i="0" u="none" strike="noStrike">
-                        <a:solidFill>
-                          <a:srgbClr val="000000"/>
-                        </a:solidFill>
-                        <a:effectLst/>
-                        <a:latin typeface="Helvetica" pitchFamily="2" charset="0"/>
-                      </a:endParaRPr>
-                    </a:p>
-                  </a:txBody>
-                  <a:tcPr marL="9525" marR="9525" marT="9525" marB="0" anchor="b"/>
-                </a:tc>
-                <a:extLst>
-                  <a:ext uri="{0D108BD9-81ED-4DB2-BD59-A6C34878D82A}">
-                    <a16:rowId xmlns:a16="http://schemas.microsoft.com/office/drawing/2014/main" val="3827916363"/>
-                  </a:ext>
-                </a:extLst>
-              </a:tr>
-              <a:tr h="203200">
-                <a:tc>
-                  <a:txBody>
-                    <a:bodyPr/>
-                    <a:lstStyle/>
-                    <a:p>
-                      <a:pPr algn="l" fontAlgn="b"/>
-                      <a:r>
-                        <a:rPr lang="en-US" sz="1200" u="none" strike="noStrike">
-                          <a:effectLst/>
-                        </a:rPr>
-                        <a:t>India</a:t>
-                      </a:r>
-                      <a:endParaRPr lang="en-US" sz="1200" b="0" i="0" u="none" strike="noStrike">
-                        <a:solidFill>
-                          <a:srgbClr val="000000"/>
-                        </a:solidFill>
-                        <a:effectLst/>
-                        <a:latin typeface="Helvetica" pitchFamily="2" charset="0"/>
-                      </a:endParaRPr>
-                    </a:p>
-                  </a:txBody>
-                  <a:tcPr marL="9525" marR="9525" marT="9525" marB="0" anchor="b"/>
-                </a:tc>
-                <a:tc>
-                  <a:txBody>
-                    <a:bodyPr/>
-                    <a:lstStyle/>
-                    <a:p>
-                      <a:pPr algn="r" fontAlgn="b"/>
-                      <a:r>
-                        <a:rPr lang="en-US" sz="1200" u="none" strike="noStrike">
-                          <a:effectLst/>
-                        </a:rPr>
-                        <a:t>32</a:t>
-                      </a:r>
-                      <a:endParaRPr lang="en-US" sz="1200" b="0" i="0" u="none" strike="noStrike">
-                        <a:solidFill>
-                          <a:srgbClr val="000000"/>
-                        </a:solidFill>
-                        <a:effectLst/>
-                        <a:latin typeface="Helvetica" pitchFamily="2" charset="0"/>
-                      </a:endParaRPr>
-                    </a:p>
-                  </a:txBody>
-                  <a:tcPr marL="9525" marR="9525" marT="9525" marB="0" anchor="b"/>
-                </a:tc>
-                <a:tc>
-                  <a:txBody>
-                    <a:bodyPr/>
-                    <a:lstStyle/>
-                    <a:p>
-                      <a:pPr algn="r" fontAlgn="b"/>
-                      <a:r>
-                        <a:rPr lang="en-US" sz="1200" u="none" strike="noStrike">
-                          <a:effectLst/>
-                        </a:rPr>
-                        <a:t>$71,049,162.50 </a:t>
-                      </a:r>
-                      <a:endParaRPr lang="en-US" sz="1200" b="0" i="0" u="none" strike="noStrike">
-                        <a:solidFill>
-                          <a:srgbClr val="000000"/>
-                        </a:solidFill>
-                        <a:effectLst/>
-                        <a:latin typeface="Helvetica" pitchFamily="2" charset="0"/>
-                      </a:endParaRPr>
-                    </a:p>
-                  </a:txBody>
-                  <a:tcPr marL="9525" marR="9525" marT="9525" marB="0" anchor="b"/>
-                </a:tc>
-                <a:extLst>
-                  <a:ext uri="{0D108BD9-81ED-4DB2-BD59-A6C34878D82A}">
-                    <a16:rowId xmlns:a16="http://schemas.microsoft.com/office/drawing/2014/main" val="3204861710"/>
-                  </a:ext>
-                </a:extLst>
-              </a:tr>
-              <a:tr h="203200">
-                <a:tc>
-                  <a:txBody>
-                    <a:bodyPr/>
-                    <a:lstStyle/>
-                    <a:p>
-                      <a:pPr algn="l" fontAlgn="b"/>
-                      <a:r>
-                        <a:rPr lang="en-US" sz="1200" u="none" strike="noStrike">
-                          <a:effectLst/>
-                        </a:rPr>
-                        <a:t>Russia</a:t>
-                      </a:r>
-                      <a:endParaRPr lang="en-US" sz="1200" b="0" i="0" u="none" strike="noStrike">
-                        <a:solidFill>
-                          <a:srgbClr val="000000"/>
-                        </a:solidFill>
-                        <a:effectLst/>
-                        <a:latin typeface="Helvetica" pitchFamily="2" charset="0"/>
-                      </a:endParaRPr>
-                    </a:p>
-                  </a:txBody>
-                  <a:tcPr marL="9525" marR="9525" marT="9525" marB="0" anchor="b"/>
-                </a:tc>
-                <a:tc>
-                  <a:txBody>
-                    <a:bodyPr/>
-                    <a:lstStyle/>
-                    <a:p>
-                      <a:pPr algn="r" fontAlgn="b"/>
-                      <a:r>
-                        <a:rPr lang="en-US" sz="1200" u="none" strike="noStrike">
-                          <a:effectLst/>
-                        </a:rPr>
-                        <a:t>18</a:t>
-                      </a:r>
-                      <a:endParaRPr lang="en-US" sz="1200" b="0" i="0" u="none" strike="noStrike">
-                        <a:solidFill>
-                          <a:srgbClr val="000000"/>
-                        </a:solidFill>
-                        <a:effectLst/>
-                        <a:latin typeface="Helvetica" pitchFamily="2" charset="0"/>
-                      </a:endParaRPr>
-                    </a:p>
-                  </a:txBody>
-                  <a:tcPr marL="9525" marR="9525" marT="9525" marB="0" anchor="b"/>
-                </a:tc>
-                <a:tc>
-                  <a:txBody>
-                    <a:bodyPr/>
-                    <a:lstStyle/>
-                    <a:p>
-                      <a:pPr algn="r" fontAlgn="b"/>
-                      <a:r>
-                        <a:rPr lang="en-US" sz="1200" u="none" strike="noStrike">
-                          <a:effectLst/>
-                        </a:rPr>
-                        <a:t>$16,993,718.06 </a:t>
-                      </a:r>
-                      <a:endParaRPr lang="en-US" sz="1200" b="0" i="0" u="none" strike="noStrike">
-                        <a:solidFill>
-                          <a:srgbClr val="000000"/>
-                        </a:solidFill>
-                        <a:effectLst/>
-                        <a:latin typeface="Helvetica" pitchFamily="2" charset="0"/>
-                      </a:endParaRPr>
-                    </a:p>
-                  </a:txBody>
-                  <a:tcPr marL="9525" marR="9525" marT="9525" marB="0" anchor="b"/>
-                </a:tc>
-                <a:extLst>
-                  <a:ext uri="{0D108BD9-81ED-4DB2-BD59-A6C34878D82A}">
-                    <a16:rowId xmlns:a16="http://schemas.microsoft.com/office/drawing/2014/main" val="2477510823"/>
-                  </a:ext>
-                </a:extLst>
-              </a:tr>
-              <a:tr h="203200">
-                <a:tc>
-                  <a:txBody>
-                    <a:bodyPr/>
-                    <a:lstStyle/>
-                    <a:p>
-                      <a:pPr algn="l" fontAlgn="b"/>
-                      <a:r>
-                        <a:rPr lang="en-US" sz="1200" u="none" strike="noStrike">
-                          <a:effectLst/>
-                        </a:rPr>
-                        <a:t>Philippines</a:t>
-                      </a:r>
-                      <a:endParaRPr lang="en-US" sz="1200" b="0" i="0" u="none" strike="noStrike">
-                        <a:solidFill>
-                          <a:srgbClr val="000000"/>
-                        </a:solidFill>
-                        <a:effectLst/>
-                        <a:latin typeface="Helvetica" pitchFamily="2" charset="0"/>
-                      </a:endParaRPr>
-                    </a:p>
-                  </a:txBody>
-                  <a:tcPr marL="9525" marR="9525" marT="9525" marB="0" anchor="b"/>
-                </a:tc>
-                <a:tc>
-                  <a:txBody>
-                    <a:bodyPr/>
-                    <a:lstStyle/>
-                    <a:p>
-                      <a:pPr algn="r" fontAlgn="b"/>
-                      <a:r>
-                        <a:rPr lang="en-US" sz="1200" u="none" strike="noStrike">
-                          <a:effectLst/>
-                        </a:rPr>
-                        <a:t>14</a:t>
-                      </a:r>
-                      <a:endParaRPr lang="en-US" sz="1200" b="0" i="0" u="none" strike="noStrike">
-                        <a:solidFill>
-                          <a:srgbClr val="000000"/>
-                        </a:solidFill>
-                        <a:effectLst/>
-                        <a:latin typeface="Helvetica" pitchFamily="2" charset="0"/>
-                      </a:endParaRPr>
-                    </a:p>
-                  </a:txBody>
-                  <a:tcPr marL="9525" marR="9525" marT="9525" marB="0" anchor="b"/>
-                </a:tc>
-                <a:tc>
-                  <a:txBody>
-                    <a:bodyPr/>
-                    <a:lstStyle/>
-                    <a:p>
-                      <a:pPr algn="r" fontAlgn="b"/>
-                      <a:r>
-                        <a:rPr lang="en-US" sz="1200" u="none" strike="noStrike">
-                          <a:effectLst/>
-                        </a:rPr>
-                        <a:t>$8,795,928.57 </a:t>
-                      </a:r>
-                      <a:endParaRPr lang="en-US" sz="1200" b="0" i="0" u="none" strike="noStrike">
-                        <a:solidFill>
-                          <a:srgbClr val="000000"/>
-                        </a:solidFill>
-                        <a:effectLst/>
-                        <a:latin typeface="Helvetica" pitchFamily="2" charset="0"/>
-                      </a:endParaRPr>
-                    </a:p>
-                  </a:txBody>
-                  <a:tcPr marL="9525" marR="9525" marT="9525" marB="0" anchor="b"/>
-                </a:tc>
-                <a:extLst>
-                  <a:ext uri="{0D108BD9-81ED-4DB2-BD59-A6C34878D82A}">
-                    <a16:rowId xmlns:a16="http://schemas.microsoft.com/office/drawing/2014/main" val="4274150872"/>
-                  </a:ext>
-                </a:extLst>
-              </a:tr>
-              <a:tr h="203200">
-                <a:tc>
-                  <a:txBody>
-                    <a:bodyPr/>
-                    <a:lstStyle/>
-                    <a:p>
-                      <a:pPr algn="l" fontAlgn="b"/>
-                      <a:r>
-                        <a:rPr lang="en-US" sz="1200" u="none" strike="noStrike">
-                          <a:effectLst/>
-                        </a:rPr>
-                        <a:t>Mexico</a:t>
-                      </a:r>
-                      <a:endParaRPr lang="en-US" sz="1200" b="0" i="0" u="none" strike="noStrike">
-                        <a:solidFill>
-                          <a:srgbClr val="000000"/>
-                        </a:solidFill>
-                        <a:effectLst/>
-                        <a:latin typeface="Helvetica" pitchFamily="2" charset="0"/>
-                      </a:endParaRPr>
-                    </a:p>
-                  </a:txBody>
-                  <a:tcPr marL="9525" marR="9525" marT="9525" marB="0" anchor="b"/>
-                </a:tc>
-                <a:tc>
-                  <a:txBody>
-                    <a:bodyPr/>
-                    <a:lstStyle/>
-                    <a:p>
-                      <a:pPr algn="r" fontAlgn="b"/>
-                      <a:r>
-                        <a:rPr lang="en-US" sz="1200" u="none" strike="noStrike">
-                          <a:effectLst/>
-                        </a:rPr>
-                        <a:t>10</a:t>
-                      </a:r>
-                      <a:endParaRPr lang="en-US" sz="1200" b="0" i="0" u="none" strike="noStrike">
-                        <a:solidFill>
-                          <a:srgbClr val="000000"/>
-                        </a:solidFill>
-                        <a:effectLst/>
-                        <a:latin typeface="Helvetica" pitchFamily="2" charset="0"/>
-                      </a:endParaRPr>
-                    </a:p>
-                  </a:txBody>
-                  <a:tcPr marL="9525" marR="9525" marT="9525" marB="0" anchor="b"/>
-                </a:tc>
-                <a:tc>
-                  <a:txBody>
-                    <a:bodyPr/>
-                    <a:lstStyle/>
-                    <a:p>
-                      <a:pPr algn="r" fontAlgn="b"/>
-                      <a:r>
-                        <a:rPr lang="en-US" sz="1200" u="none" strike="noStrike">
-                          <a:effectLst/>
-                        </a:rPr>
-                        <a:t>$5,028,200.00 </a:t>
-                      </a:r>
-                      <a:endParaRPr lang="en-US" sz="1200" b="0" i="0" u="none" strike="noStrike">
-                        <a:solidFill>
-                          <a:srgbClr val="000000"/>
-                        </a:solidFill>
-                        <a:effectLst/>
-                        <a:latin typeface="Helvetica" pitchFamily="2" charset="0"/>
-                      </a:endParaRPr>
-                    </a:p>
-                  </a:txBody>
-                  <a:tcPr marL="9525" marR="9525" marT="9525" marB="0" anchor="b"/>
-                </a:tc>
-                <a:extLst>
-                  <a:ext uri="{0D108BD9-81ED-4DB2-BD59-A6C34878D82A}">
-                    <a16:rowId xmlns:a16="http://schemas.microsoft.com/office/drawing/2014/main" val="1716238827"/>
-                  </a:ext>
-                </a:extLst>
-              </a:tr>
-              <a:tr h="203200">
-                <a:tc>
-                  <a:txBody>
-                    <a:bodyPr/>
-                    <a:lstStyle/>
-                    <a:p>
-                      <a:pPr algn="l" fontAlgn="b"/>
-                      <a:r>
-                        <a:rPr lang="en-US" sz="1200" u="none" strike="noStrike">
-                          <a:effectLst/>
-                        </a:rPr>
-                        <a:t>USA</a:t>
-                      </a:r>
-                      <a:endParaRPr lang="en-US" sz="1200" b="0" i="0" u="none" strike="noStrike">
-                        <a:solidFill>
-                          <a:srgbClr val="000000"/>
-                        </a:solidFill>
-                        <a:effectLst/>
-                        <a:latin typeface="Helvetica" pitchFamily="2" charset="0"/>
-                      </a:endParaRPr>
-                    </a:p>
-                  </a:txBody>
-                  <a:tcPr marL="9525" marR="9525" marT="9525" marB="0" anchor="b"/>
-                </a:tc>
-                <a:tc>
-                  <a:txBody>
-                    <a:bodyPr/>
-                    <a:lstStyle/>
-                    <a:p>
-                      <a:pPr algn="r" fontAlgn="b"/>
-                      <a:r>
-                        <a:rPr lang="en-US" sz="1200" u="none" strike="noStrike">
-                          <a:effectLst/>
-                        </a:rPr>
-                        <a:t>834</a:t>
-                      </a:r>
-                      <a:endParaRPr lang="en-US" sz="1200" b="0" i="0" u="none" strike="noStrike">
-                        <a:solidFill>
-                          <a:srgbClr val="000000"/>
-                        </a:solidFill>
-                        <a:effectLst/>
-                        <a:latin typeface="Helvetica" pitchFamily="2" charset="0"/>
-                      </a:endParaRPr>
-                    </a:p>
-                  </a:txBody>
-                  <a:tcPr marL="9525" marR="9525" marT="9525" marB="0" anchor="b"/>
-                </a:tc>
-                <a:tc>
-                  <a:txBody>
-                    <a:bodyPr/>
-                    <a:lstStyle/>
-                    <a:p>
-                      <a:pPr algn="r" fontAlgn="b"/>
-                      <a:r>
-                        <a:rPr lang="en-US" sz="1200" u="none" strike="noStrike">
-                          <a:effectLst/>
-                        </a:rPr>
-                        <a:t>$4,257,310.12 </a:t>
-                      </a:r>
-                      <a:endParaRPr lang="en-US" sz="1200" b="0" i="0" u="none" strike="noStrike">
-                        <a:solidFill>
-                          <a:srgbClr val="000000"/>
-                        </a:solidFill>
-                        <a:effectLst/>
-                        <a:latin typeface="Helvetica" pitchFamily="2" charset="0"/>
-                      </a:endParaRPr>
-                    </a:p>
-                  </a:txBody>
-                  <a:tcPr marL="9525" marR="9525" marT="9525" marB="0" anchor="b"/>
-                </a:tc>
-                <a:extLst>
-                  <a:ext uri="{0D108BD9-81ED-4DB2-BD59-A6C34878D82A}">
-                    <a16:rowId xmlns:a16="http://schemas.microsoft.com/office/drawing/2014/main" val="3869400624"/>
-                  </a:ext>
-                </a:extLst>
-              </a:tr>
-              <a:tr h="203200">
-                <a:tc>
-                  <a:txBody>
-                    <a:bodyPr/>
-                    <a:lstStyle/>
-                    <a:p>
-                      <a:pPr algn="l" fontAlgn="b"/>
-                      <a:r>
-                        <a:rPr lang="en-US" sz="1200" u="none" strike="noStrike">
-                          <a:effectLst/>
-                        </a:rPr>
-                        <a:t>France</a:t>
-                      </a:r>
-                      <a:endParaRPr lang="en-US" sz="1200" b="0" i="0" u="none" strike="noStrike">
-                        <a:solidFill>
-                          <a:srgbClr val="000000"/>
-                        </a:solidFill>
-                        <a:effectLst/>
-                        <a:latin typeface="Helvetica" pitchFamily="2" charset="0"/>
-                      </a:endParaRPr>
-                    </a:p>
-                  </a:txBody>
-                  <a:tcPr marL="9525" marR="9525" marT="9525" marB="0" anchor="b"/>
-                </a:tc>
-                <a:tc>
-                  <a:txBody>
-                    <a:bodyPr/>
-                    <a:lstStyle/>
-                    <a:p>
-                      <a:pPr algn="r" fontAlgn="b"/>
-                      <a:r>
-                        <a:rPr lang="en-US" sz="1200" u="none" strike="noStrike">
-                          <a:effectLst/>
-                        </a:rPr>
-                        <a:t>12</a:t>
-                      </a:r>
-                      <a:endParaRPr lang="en-US" sz="1200" b="0" i="0" u="none" strike="noStrike">
-                        <a:solidFill>
-                          <a:srgbClr val="000000"/>
-                        </a:solidFill>
-                        <a:effectLst/>
-                        <a:latin typeface="Helvetica" pitchFamily="2" charset="0"/>
-                      </a:endParaRPr>
-                    </a:p>
-                  </a:txBody>
-                  <a:tcPr marL="9525" marR="9525" marT="9525" marB="0" anchor="b"/>
-                </a:tc>
-                <a:tc>
-                  <a:txBody>
-                    <a:bodyPr/>
-                    <a:lstStyle/>
-                    <a:p>
-                      <a:pPr algn="r" fontAlgn="b"/>
-                      <a:r>
-                        <a:rPr lang="en-US" sz="1200" u="none" strike="noStrike">
-                          <a:effectLst/>
-                        </a:rPr>
-                        <a:t>$3,508,227.17 </a:t>
-                      </a:r>
-                      <a:endParaRPr lang="en-US" sz="1200" b="0" i="0" u="none" strike="noStrike">
-                        <a:solidFill>
-                          <a:srgbClr val="000000"/>
-                        </a:solidFill>
-                        <a:effectLst/>
-                        <a:latin typeface="Helvetica" pitchFamily="2" charset="0"/>
-                      </a:endParaRPr>
-                    </a:p>
-                  </a:txBody>
-                  <a:tcPr marL="9525" marR="9525" marT="9525" marB="0" anchor="b"/>
-                </a:tc>
-                <a:extLst>
-                  <a:ext uri="{0D108BD9-81ED-4DB2-BD59-A6C34878D82A}">
-                    <a16:rowId xmlns:a16="http://schemas.microsoft.com/office/drawing/2014/main" val="2283792811"/>
-                  </a:ext>
-                </a:extLst>
-              </a:tr>
-              <a:tr h="203200">
-                <a:tc>
-                  <a:txBody>
-                    <a:bodyPr/>
-                    <a:lstStyle/>
-                    <a:p>
-                      <a:pPr algn="l" fontAlgn="b"/>
-                      <a:r>
-                        <a:rPr lang="en-US" sz="1200" u="none" strike="noStrike">
-                          <a:effectLst/>
-                        </a:rPr>
-                        <a:t>Japan</a:t>
-                      </a:r>
-                      <a:endParaRPr lang="en-US" sz="1200" b="0" i="0" u="none" strike="noStrike">
-                        <a:solidFill>
-                          <a:srgbClr val="000000"/>
-                        </a:solidFill>
-                        <a:effectLst/>
-                        <a:latin typeface="Helvetica" pitchFamily="2" charset="0"/>
-                      </a:endParaRPr>
-                    </a:p>
-                  </a:txBody>
-                  <a:tcPr marL="9525" marR="9525" marT="9525" marB="0" anchor="b"/>
-                </a:tc>
-                <a:tc>
-                  <a:txBody>
-                    <a:bodyPr/>
-                    <a:lstStyle/>
-                    <a:p>
-                      <a:pPr algn="r" fontAlgn="b"/>
-                      <a:r>
-                        <a:rPr lang="en-US" sz="1200" u="none" strike="noStrike">
-                          <a:effectLst/>
-                        </a:rPr>
-                        <a:t>11</a:t>
-                      </a:r>
-                      <a:endParaRPr lang="en-US" sz="1200" b="0" i="0" u="none" strike="noStrike">
-                        <a:solidFill>
-                          <a:srgbClr val="000000"/>
-                        </a:solidFill>
-                        <a:effectLst/>
-                        <a:latin typeface="Helvetica" pitchFamily="2" charset="0"/>
-                      </a:endParaRPr>
-                    </a:p>
-                  </a:txBody>
-                  <a:tcPr marL="9525" marR="9525" marT="9525" marB="0" anchor="b"/>
-                </a:tc>
-                <a:tc>
-                  <a:txBody>
-                    <a:bodyPr/>
-                    <a:lstStyle/>
-                    <a:p>
-                      <a:pPr algn="r" fontAlgn="b"/>
-                      <a:r>
-                        <a:rPr lang="en-US" sz="1200" u="none" strike="noStrike">
-                          <a:effectLst/>
-                        </a:rPr>
-                        <a:t>$3,385,727.27 </a:t>
-                      </a:r>
-                      <a:endParaRPr lang="en-US" sz="1200" b="0" i="0" u="none" strike="noStrike">
-                        <a:solidFill>
-                          <a:srgbClr val="000000"/>
-                        </a:solidFill>
-                        <a:effectLst/>
-                        <a:latin typeface="Helvetica" pitchFamily="2" charset="0"/>
-                      </a:endParaRPr>
-                    </a:p>
-                  </a:txBody>
-                  <a:tcPr marL="9525" marR="9525" marT="9525" marB="0" anchor="b"/>
-                </a:tc>
-                <a:extLst>
-                  <a:ext uri="{0D108BD9-81ED-4DB2-BD59-A6C34878D82A}">
-                    <a16:rowId xmlns:a16="http://schemas.microsoft.com/office/drawing/2014/main" val="2070933118"/>
-                  </a:ext>
-                </a:extLst>
-              </a:tr>
-              <a:tr h="203200">
-                <a:tc>
-                  <a:txBody>
-                    <a:bodyPr/>
-                    <a:lstStyle/>
-                    <a:p>
-                      <a:pPr algn="l" fontAlgn="b"/>
-                      <a:r>
-                        <a:rPr lang="en-US" sz="1200" u="none" strike="noStrike">
-                          <a:effectLst/>
-                        </a:rPr>
-                        <a:t>Spain</a:t>
-                      </a:r>
-                      <a:endParaRPr lang="en-US" sz="1200" b="0" i="0" u="none" strike="noStrike">
-                        <a:solidFill>
-                          <a:srgbClr val="000000"/>
-                        </a:solidFill>
-                        <a:effectLst/>
-                        <a:latin typeface="Helvetica" pitchFamily="2" charset="0"/>
-                      </a:endParaRPr>
-                    </a:p>
-                  </a:txBody>
-                  <a:tcPr marL="9525" marR="9525" marT="9525" marB="0" anchor="b"/>
-                </a:tc>
-                <a:tc>
-                  <a:txBody>
-                    <a:bodyPr/>
-                    <a:lstStyle/>
-                    <a:p>
-                      <a:pPr algn="r" fontAlgn="b"/>
-                      <a:r>
-                        <a:rPr lang="en-US" sz="1200" u="none" strike="noStrike">
-                          <a:effectLst/>
-                        </a:rPr>
-                        <a:t>15</a:t>
-                      </a:r>
-                      <a:endParaRPr lang="en-US" sz="1200" b="0" i="0" u="none" strike="noStrike">
-                        <a:solidFill>
-                          <a:srgbClr val="000000"/>
-                        </a:solidFill>
-                        <a:effectLst/>
-                        <a:latin typeface="Helvetica" pitchFamily="2" charset="0"/>
-                      </a:endParaRPr>
-                    </a:p>
-                  </a:txBody>
-                  <a:tcPr marL="9525" marR="9525" marT="9525" marB="0" anchor="b"/>
-                </a:tc>
-                <a:tc>
-                  <a:txBody>
-                    <a:bodyPr/>
-                    <a:lstStyle/>
-                    <a:p>
-                      <a:pPr algn="r" fontAlgn="b"/>
-                      <a:r>
-                        <a:rPr lang="en-US" sz="1200" u="none" strike="noStrike">
-                          <a:effectLst/>
-                        </a:rPr>
-                        <a:t>$3,183,413.33 </a:t>
-                      </a:r>
-                      <a:endParaRPr lang="en-US" sz="1200" b="0" i="0" u="none" strike="noStrike">
-                        <a:solidFill>
-                          <a:srgbClr val="000000"/>
-                        </a:solidFill>
-                        <a:effectLst/>
-                        <a:latin typeface="Helvetica" pitchFamily="2" charset="0"/>
-                      </a:endParaRPr>
-                    </a:p>
-                  </a:txBody>
-                  <a:tcPr marL="9525" marR="9525" marT="9525" marB="0" anchor="b"/>
-                </a:tc>
-                <a:extLst>
-                  <a:ext uri="{0D108BD9-81ED-4DB2-BD59-A6C34878D82A}">
-                    <a16:rowId xmlns:a16="http://schemas.microsoft.com/office/drawing/2014/main" val="2327933506"/>
-                  </a:ext>
-                </a:extLst>
-              </a:tr>
-              <a:tr h="203200">
-                <a:tc>
-                  <a:txBody>
-                    <a:bodyPr/>
-                    <a:lstStyle/>
-                    <a:p>
-                      <a:pPr algn="l" fontAlgn="b"/>
-                      <a:r>
-                        <a:rPr lang="en-US" sz="1200" u="none" strike="noStrike">
-                          <a:effectLst/>
-                        </a:rPr>
-                        <a:t>Australia</a:t>
-                      </a:r>
-                      <a:endParaRPr lang="en-US" sz="1200" b="0" i="0" u="none" strike="noStrike">
-                        <a:solidFill>
-                          <a:srgbClr val="000000"/>
-                        </a:solidFill>
-                        <a:effectLst/>
-                        <a:latin typeface="Helvetica" pitchFamily="2" charset="0"/>
-                      </a:endParaRPr>
-                    </a:p>
-                  </a:txBody>
-                  <a:tcPr marL="9525" marR="9525" marT="9525" marB="0" anchor="b"/>
-                </a:tc>
-                <a:tc>
-                  <a:txBody>
-                    <a:bodyPr/>
-                    <a:lstStyle/>
-                    <a:p>
-                      <a:pPr algn="r" fontAlgn="b"/>
-                      <a:r>
-                        <a:rPr lang="en-US" sz="1200" u="none" strike="noStrike">
-                          <a:effectLst/>
-                        </a:rPr>
-                        <a:t>14</a:t>
-                      </a:r>
-                      <a:endParaRPr lang="en-US" sz="1200" b="0" i="0" u="none" strike="noStrike">
-                        <a:solidFill>
-                          <a:srgbClr val="000000"/>
-                        </a:solidFill>
-                        <a:effectLst/>
-                        <a:latin typeface="Helvetica" pitchFamily="2" charset="0"/>
-                      </a:endParaRPr>
-                    </a:p>
-                  </a:txBody>
-                  <a:tcPr marL="9525" marR="9525" marT="9525" marB="0" anchor="b"/>
-                </a:tc>
-                <a:tc>
-                  <a:txBody>
-                    <a:bodyPr/>
-                    <a:lstStyle/>
-                    <a:p>
-                      <a:pPr algn="r" fontAlgn="b"/>
-                      <a:r>
-                        <a:rPr lang="en-US" sz="1200" u="none" strike="noStrike">
-                          <a:effectLst/>
-                        </a:rPr>
-                        <a:t>$3,142,000.00 </a:t>
-                      </a:r>
-                      <a:endParaRPr lang="en-US" sz="1200" b="0" i="0" u="none" strike="noStrike">
-                        <a:solidFill>
-                          <a:srgbClr val="000000"/>
-                        </a:solidFill>
-                        <a:effectLst/>
-                        <a:latin typeface="Helvetica" pitchFamily="2" charset="0"/>
-                      </a:endParaRPr>
-                    </a:p>
-                  </a:txBody>
-                  <a:tcPr marL="9525" marR="9525" marT="9525" marB="0" anchor="b"/>
-                </a:tc>
-                <a:extLst>
-                  <a:ext uri="{0D108BD9-81ED-4DB2-BD59-A6C34878D82A}">
-                    <a16:rowId xmlns:a16="http://schemas.microsoft.com/office/drawing/2014/main" val="416398243"/>
-                  </a:ext>
-                </a:extLst>
-              </a:tr>
-              <a:tr h="203200">
-                <a:tc>
-                  <a:txBody>
-                    <a:bodyPr/>
-                    <a:lstStyle/>
-                    <a:p>
-                      <a:pPr algn="l" fontAlgn="b"/>
-                      <a:r>
-                        <a:rPr lang="en-US" sz="1200" u="none" strike="noStrike">
-                          <a:effectLst/>
-                        </a:rPr>
-                        <a:t>Peru</a:t>
-                      </a:r>
-                      <a:endParaRPr lang="en-US" sz="1200" b="0" i="0" u="none" strike="noStrike">
-                        <a:solidFill>
-                          <a:srgbClr val="000000"/>
-                        </a:solidFill>
-                        <a:effectLst/>
-                        <a:latin typeface="Helvetica" pitchFamily="2" charset="0"/>
-                      </a:endParaRPr>
-                    </a:p>
-                  </a:txBody>
-                  <a:tcPr marL="9525" marR="9525" marT="9525" marB="0" anchor="b"/>
-                </a:tc>
-                <a:tc>
-                  <a:txBody>
-                    <a:bodyPr/>
-                    <a:lstStyle/>
-                    <a:p>
-                      <a:pPr algn="r" fontAlgn="b"/>
-                      <a:r>
-                        <a:rPr lang="en-US" sz="1200" u="none" strike="noStrike">
-                          <a:effectLst/>
-                        </a:rPr>
-                        <a:t>11</a:t>
-                      </a:r>
-                      <a:endParaRPr lang="en-US" sz="1200" b="0" i="0" u="none" strike="noStrike">
-                        <a:solidFill>
-                          <a:srgbClr val="000000"/>
-                        </a:solidFill>
-                        <a:effectLst/>
-                        <a:latin typeface="Helvetica" pitchFamily="2" charset="0"/>
-                      </a:endParaRPr>
-                    </a:p>
-                  </a:txBody>
-                  <a:tcPr marL="9525" marR="9525" marT="9525" marB="0" anchor="b"/>
-                </a:tc>
-                <a:tc>
-                  <a:txBody>
-                    <a:bodyPr/>
-                    <a:lstStyle/>
-                    <a:p>
-                      <a:pPr algn="r" fontAlgn="b"/>
-                      <a:r>
-                        <a:rPr lang="en-US" sz="1200" u="none" strike="noStrike">
-                          <a:effectLst/>
-                        </a:rPr>
-                        <a:t>$1,041,000.00 </a:t>
-                      </a:r>
-                      <a:endParaRPr lang="en-US" sz="1200" b="0" i="0" u="none" strike="noStrike">
-                        <a:solidFill>
-                          <a:srgbClr val="000000"/>
-                        </a:solidFill>
-                        <a:effectLst/>
-                        <a:latin typeface="Helvetica" pitchFamily="2" charset="0"/>
-                      </a:endParaRPr>
-                    </a:p>
-                  </a:txBody>
-                  <a:tcPr marL="9525" marR="9525" marT="9525" marB="0" anchor="b"/>
-                </a:tc>
-                <a:extLst>
-                  <a:ext uri="{0D108BD9-81ED-4DB2-BD59-A6C34878D82A}">
-                    <a16:rowId xmlns:a16="http://schemas.microsoft.com/office/drawing/2014/main" val="2871420492"/>
-                  </a:ext>
-                </a:extLst>
-              </a:tr>
-              <a:tr h="203200">
-                <a:tc>
-                  <a:txBody>
-                    <a:bodyPr/>
-                    <a:lstStyle/>
-                    <a:p>
-                      <a:pPr algn="l" fontAlgn="b"/>
-                      <a:r>
-                        <a:rPr lang="en-US" sz="1200" u="none" strike="noStrike">
-                          <a:effectLst/>
-                        </a:rPr>
-                        <a:t>UK</a:t>
-                      </a:r>
-                      <a:endParaRPr lang="en-US" sz="1200" b="0" i="0" u="none" strike="noStrike">
-                        <a:solidFill>
-                          <a:srgbClr val="000000"/>
-                        </a:solidFill>
-                        <a:effectLst/>
-                        <a:latin typeface="Helvetica" pitchFamily="2" charset="0"/>
-                      </a:endParaRPr>
-                    </a:p>
-                  </a:txBody>
-                  <a:tcPr marL="9525" marR="9525" marT="9525" marB="0" anchor="b"/>
-                </a:tc>
-                <a:tc>
-                  <a:txBody>
-                    <a:bodyPr/>
-                    <a:lstStyle/>
-                    <a:p>
-                      <a:pPr algn="r" fontAlgn="b"/>
-                      <a:r>
-                        <a:rPr lang="en-US" sz="1200" u="none" strike="noStrike">
-                          <a:effectLst/>
-                        </a:rPr>
-                        <a:t>86</a:t>
-                      </a:r>
-                      <a:endParaRPr lang="en-US" sz="1200" b="0" i="0" u="none" strike="noStrike">
-                        <a:solidFill>
-                          <a:srgbClr val="000000"/>
-                        </a:solidFill>
-                        <a:effectLst/>
-                        <a:latin typeface="Helvetica" pitchFamily="2" charset="0"/>
-                      </a:endParaRPr>
-                    </a:p>
-                  </a:txBody>
-                  <a:tcPr marL="9525" marR="9525" marT="9525" marB="0" anchor="b"/>
-                </a:tc>
-                <a:tc>
-                  <a:txBody>
-                    <a:bodyPr/>
-                    <a:lstStyle/>
-                    <a:p>
-                      <a:pPr algn="r" fontAlgn="b"/>
-                      <a:r>
-                        <a:rPr lang="en-US" sz="1200" u="none" strike="noStrike">
-                          <a:effectLst/>
-                        </a:rPr>
-                        <a:t>$1,022,959.80 </a:t>
-                      </a:r>
-                      <a:endParaRPr lang="en-US" sz="1200" b="0" i="0" u="none" strike="noStrike">
-                        <a:solidFill>
-                          <a:srgbClr val="000000"/>
-                        </a:solidFill>
-                        <a:effectLst/>
-                        <a:latin typeface="Helvetica" pitchFamily="2" charset="0"/>
-                      </a:endParaRPr>
-                    </a:p>
-                  </a:txBody>
-                  <a:tcPr marL="9525" marR="9525" marT="9525" marB="0" anchor="b"/>
-                </a:tc>
-                <a:extLst>
-                  <a:ext uri="{0D108BD9-81ED-4DB2-BD59-A6C34878D82A}">
-                    <a16:rowId xmlns:a16="http://schemas.microsoft.com/office/drawing/2014/main" val="2372218488"/>
-                  </a:ext>
-                </a:extLst>
-              </a:tr>
-              <a:tr h="203200">
-                <a:tc>
-                  <a:txBody>
-                    <a:bodyPr/>
-                    <a:lstStyle/>
-                    <a:p>
-                      <a:pPr algn="l" fontAlgn="b"/>
-                      <a:r>
-                        <a:rPr lang="en-US" sz="1200" u="none" strike="noStrike">
-                          <a:effectLst/>
-                        </a:rPr>
-                        <a:t>Germany</a:t>
-                      </a:r>
-                      <a:endParaRPr lang="en-US" sz="1200" b="0" i="0" u="none" strike="noStrike">
-                        <a:solidFill>
-                          <a:srgbClr val="000000"/>
-                        </a:solidFill>
-                        <a:effectLst/>
-                        <a:latin typeface="Helvetica" pitchFamily="2" charset="0"/>
-                      </a:endParaRPr>
-                    </a:p>
-                  </a:txBody>
-                  <a:tcPr marL="9525" marR="9525" marT="9525" marB="0" anchor="b"/>
-                </a:tc>
-                <a:tc>
-                  <a:txBody>
-                    <a:bodyPr/>
-                    <a:lstStyle/>
-                    <a:p>
-                      <a:pPr algn="r" fontAlgn="b"/>
-                      <a:r>
-                        <a:rPr lang="en-US" sz="1200" u="none" strike="noStrike">
-                          <a:effectLst/>
-                        </a:rPr>
-                        <a:t>21</a:t>
-                      </a:r>
-                      <a:endParaRPr lang="en-US" sz="1200" b="0" i="0" u="none" strike="noStrike">
-                        <a:solidFill>
-                          <a:srgbClr val="000000"/>
-                        </a:solidFill>
-                        <a:effectLst/>
-                        <a:latin typeface="Helvetica" pitchFamily="2" charset="0"/>
-                      </a:endParaRPr>
-                    </a:p>
-                  </a:txBody>
-                  <a:tcPr marL="9525" marR="9525" marT="9525" marB="0" anchor="b"/>
-                </a:tc>
-                <a:tc>
-                  <a:txBody>
-                    <a:bodyPr/>
-                    <a:lstStyle/>
-                    <a:p>
-                      <a:pPr algn="r" fontAlgn="b"/>
-                      <a:r>
-                        <a:rPr lang="en-US" sz="1200" u="none" strike="noStrike">
-                          <a:effectLst/>
-                        </a:rPr>
-                        <a:t>$927,872.10 </a:t>
-                      </a:r>
-                      <a:endParaRPr lang="en-US" sz="1200" b="0" i="0" u="none" strike="noStrike">
-                        <a:solidFill>
-                          <a:srgbClr val="000000"/>
-                        </a:solidFill>
-                        <a:effectLst/>
-                        <a:latin typeface="Helvetica" pitchFamily="2" charset="0"/>
-                      </a:endParaRPr>
-                    </a:p>
-                  </a:txBody>
-                  <a:tcPr marL="9525" marR="9525" marT="9525" marB="0" anchor="b"/>
-                </a:tc>
-                <a:extLst>
-                  <a:ext uri="{0D108BD9-81ED-4DB2-BD59-A6C34878D82A}">
-                    <a16:rowId xmlns:a16="http://schemas.microsoft.com/office/drawing/2014/main" val="1826076394"/>
-                  </a:ext>
-                </a:extLst>
-              </a:tr>
-              <a:tr h="203200">
-                <a:tc>
-                  <a:txBody>
-                    <a:bodyPr/>
-                    <a:lstStyle/>
-                    <a:p>
-                      <a:pPr algn="l" fontAlgn="b"/>
-                      <a:r>
-                        <a:rPr lang="en-US" sz="1200" u="none" strike="noStrike">
-                          <a:effectLst/>
-                        </a:rPr>
-                        <a:t>Italy</a:t>
-                      </a:r>
-                      <a:endParaRPr lang="en-US" sz="1200" b="0" i="0" u="none" strike="noStrike">
-                        <a:solidFill>
-                          <a:srgbClr val="000000"/>
-                        </a:solidFill>
-                        <a:effectLst/>
-                        <a:latin typeface="Helvetica" pitchFamily="2" charset="0"/>
-                      </a:endParaRPr>
-                    </a:p>
-                  </a:txBody>
-                  <a:tcPr marL="9525" marR="9525" marT="9525" marB="0" anchor="b"/>
-                </a:tc>
-                <a:tc>
-                  <a:txBody>
-                    <a:bodyPr/>
-                    <a:lstStyle/>
-                    <a:p>
-                      <a:pPr algn="r" fontAlgn="b"/>
-                      <a:r>
-                        <a:rPr lang="en-US" sz="1200" u="none" strike="noStrike">
-                          <a:effectLst/>
-                        </a:rPr>
-                        <a:t>12</a:t>
-                      </a:r>
-                      <a:endParaRPr lang="en-US" sz="1200" b="0" i="0" u="none" strike="noStrike">
-                        <a:solidFill>
-                          <a:srgbClr val="000000"/>
-                        </a:solidFill>
-                        <a:effectLst/>
-                        <a:latin typeface="Helvetica" pitchFamily="2" charset="0"/>
-                      </a:endParaRPr>
-                    </a:p>
-                  </a:txBody>
-                  <a:tcPr marL="9525" marR="9525" marT="9525" marB="0" anchor="b"/>
-                </a:tc>
-                <a:tc>
-                  <a:txBody>
-                    <a:bodyPr/>
-                    <a:lstStyle/>
-                    <a:p>
-                      <a:pPr algn="r" fontAlgn="b"/>
-                      <a:r>
-                        <a:rPr lang="en-US" sz="1200" u="none" strike="noStrike">
-                          <a:effectLst/>
-                        </a:rPr>
-                        <a:t>$560,791.67 </a:t>
-                      </a:r>
-                      <a:endParaRPr lang="en-US" sz="1200" b="0" i="0" u="none" strike="noStrike">
-                        <a:solidFill>
-                          <a:srgbClr val="000000"/>
-                        </a:solidFill>
-                        <a:effectLst/>
-                        <a:latin typeface="Helvetica" pitchFamily="2" charset="0"/>
-                      </a:endParaRPr>
-                    </a:p>
-                  </a:txBody>
-                  <a:tcPr marL="9525" marR="9525" marT="9525" marB="0" anchor="b"/>
-                </a:tc>
-                <a:extLst>
-                  <a:ext uri="{0D108BD9-81ED-4DB2-BD59-A6C34878D82A}">
-                    <a16:rowId xmlns:a16="http://schemas.microsoft.com/office/drawing/2014/main" val="3343626778"/>
-                  </a:ext>
-                </a:extLst>
-              </a:tr>
-              <a:tr h="203200">
-                <a:tc>
-                  <a:txBody>
-                    <a:bodyPr/>
-                    <a:lstStyle/>
-                    <a:p>
-                      <a:pPr algn="l" fontAlgn="b"/>
-                      <a:r>
-                        <a:rPr lang="en-US" sz="1200" u="none" strike="noStrike">
-                          <a:effectLst/>
-                        </a:rPr>
-                        <a:t>Canada</a:t>
-                      </a:r>
-                      <a:endParaRPr lang="en-US" sz="1200" b="0" i="0" u="none" strike="noStrike">
-                        <a:solidFill>
-                          <a:srgbClr val="000000"/>
-                        </a:solidFill>
-                        <a:effectLst/>
-                        <a:latin typeface="Helvetica" pitchFamily="2" charset="0"/>
-                      </a:endParaRPr>
-                    </a:p>
-                  </a:txBody>
-                  <a:tcPr marL="9525" marR="9525" marT="9525" marB="0" anchor="b"/>
-                </a:tc>
-                <a:tc>
-                  <a:txBody>
-                    <a:bodyPr/>
-                    <a:lstStyle/>
-                    <a:p>
-                      <a:pPr algn="r" fontAlgn="b"/>
-                      <a:r>
-                        <a:rPr lang="en-US" sz="1200" u="none" strike="noStrike">
-                          <a:effectLst/>
-                        </a:rPr>
-                        <a:t>23</a:t>
-                      </a:r>
-                      <a:endParaRPr lang="en-US" sz="1200" b="0" i="0" u="none" strike="noStrike">
-                        <a:solidFill>
-                          <a:srgbClr val="000000"/>
-                        </a:solidFill>
-                        <a:effectLst/>
-                        <a:latin typeface="Helvetica" pitchFamily="2" charset="0"/>
-                      </a:endParaRPr>
-                    </a:p>
-                  </a:txBody>
-                  <a:tcPr marL="9525" marR="9525" marT="9525" marB="0" anchor="b"/>
-                </a:tc>
-                <a:tc>
-                  <a:txBody>
-                    <a:bodyPr/>
-                    <a:lstStyle/>
-                    <a:p>
-                      <a:pPr algn="r" fontAlgn="b"/>
-                      <a:r>
-                        <a:rPr lang="en-US" sz="1200" u="none" strike="noStrike" dirty="0">
-                          <a:effectLst/>
-                        </a:rPr>
-                        <a:t>$529,631.78 </a:t>
-                      </a:r>
-                      <a:endParaRPr lang="en-US" sz="1200" b="0" i="0" u="none" strike="noStrike" dirty="0">
-                        <a:solidFill>
-                          <a:srgbClr val="000000"/>
-                        </a:solidFill>
-                        <a:effectLst/>
-                        <a:latin typeface="Helvetica" pitchFamily="2" charset="0"/>
-                      </a:endParaRPr>
-                    </a:p>
-                  </a:txBody>
-                  <a:tcPr marL="9525" marR="9525" marT="9525" marB="0" anchor="b"/>
-                </a:tc>
-                <a:extLst>
-                  <a:ext uri="{0D108BD9-81ED-4DB2-BD59-A6C34878D82A}">
-                    <a16:rowId xmlns:a16="http://schemas.microsoft.com/office/drawing/2014/main" val="1306949815"/>
-                  </a:ext>
-                </a:extLst>
-              </a:tr>
-            </a:tbl>
-          </a:graphicData>
-        </a:graphic>
-      </p:graphicFrame>
+          <p:cNvPicPr>
+            <a:picLocks noChangeAspect="1"/>
+          </p:cNvPicPr>
+          <p:nvPr/>
+        </p:nvPicPr>
+        <p:blipFill rotWithShape="1">
+          <a:blip r:embed="rId2"/>
+          <a:srcRect l="11360" t="14544" r="7769" b="7046"/>
+          <a:stretch/>
+        </p:blipFill>
+        <p:spPr>
+          <a:xfrm>
+            <a:off x="7518848" y="2358951"/>
+            <a:ext cx="4113172" cy="4157330"/>
+          </a:xfrm>
+          <a:prstGeom prst="roundRect">
+            <a:avLst>
+              <a:gd name="adj" fmla="val 1858"/>
+            </a:avLst>
+          </a:prstGeom>
+          <a:effectLst>
+            <a:outerShdw blurRad="50800" dist="50800" dir="5400000" algn="tl" rotWithShape="0">
+              <a:srgbClr val="000000">
+                <a:alpha val="43000"/>
+              </a:srgbClr>
+            </a:outerShdw>
+          </a:effectLst>
+        </p:spPr>
+      </p:pic>
     </p:spTree>
     <p:extLst>
       <p:ext uri="{BB962C8B-B14F-4D97-AF65-F5344CB8AC3E}">
-        <p14:creationId xmlns:p14="http://schemas.microsoft.com/office/powerpoint/2010/main" val="2295519023"/>
+        <p14:creationId xmlns:p14="http://schemas.microsoft.com/office/powerpoint/2010/main" val="4160845107"/>
       </p:ext>
     </p:extLst>
   </p:cSld>

</xml_diff>